<commit_message>
Added messaging config for finance
</commit_message>
<xml_diff>
--- a/Spring boot - adapting to your environment.pptx
+++ b/Spring boot - adapting to your environment.pptx
@@ -9,7 +9,11 @@
     <p:sldId id="257" r:id="rId3"/>
     <p:sldId id="258" r:id="rId4"/>
     <p:sldId id="259" r:id="rId5"/>
-    <p:sldId id="260" r:id="rId6"/>
+    <p:sldId id="261" r:id="rId6"/>
+    <p:sldId id="260" r:id="rId7"/>
+    <p:sldId id="262" r:id="rId8"/>
+    <p:sldId id="263" r:id="rId9"/>
+    <p:sldId id="264" r:id="rId10"/>
   </p:sldIdLst>
   <p:sldSz cx="12192000" cy="6858000"/>
   <p:notesSz cx="6858000" cy="9144000"/>
@@ -292,7 +296,7 @@
               <a:rPr lang="en-US" smtClean="0"/>
               <a:t>05/03/2017</a:t>
             </a:fld>
-            <a:endParaRPr lang="en-US"/>
+            <a:endParaRPr lang="en-US" dirty="0"/>
           </a:p>
         </p:txBody>
       </p:sp>
@@ -316,7 +320,7 @@
           <a:bodyPr/>
           <a:lstStyle/>
           <a:p>
-            <a:endParaRPr lang="en-US"/>
+            <a:endParaRPr lang="en-US" dirty="0"/>
           </a:p>
         </p:txBody>
       </p:sp>
@@ -344,7 +348,7 @@
               <a:rPr lang="en-US" smtClean="0"/>
               <a:t>‹nr.›</a:t>
             </a:fld>
-            <a:endParaRPr lang="en-US"/>
+            <a:endParaRPr lang="en-US" dirty="0"/>
           </a:p>
         </p:txBody>
       </p:sp>
@@ -468,7 +472,7 @@
           </a:lstStyle>
           <a:p>
             <a:r>
-              <a:rPr lang="nl-NL"/>
+              <a:rPr lang="nl-NL" dirty="0"/>
               <a:t>Klik op het pictogram als u een afbeelding wilt toevoegen</a:t>
             </a:r>
             <a:endParaRPr lang="en-US" dirty="0"/>
@@ -559,7 +563,7 @@
               <a:rPr lang="en-US" smtClean="0"/>
               <a:t>05/03/2017</a:t>
             </a:fld>
-            <a:endParaRPr lang="en-US"/>
+            <a:endParaRPr lang="en-US" dirty="0"/>
           </a:p>
         </p:txBody>
       </p:sp>
@@ -578,7 +582,7 @@
           <a:bodyPr/>
           <a:lstStyle/>
           <a:p>
-            <a:endParaRPr lang="en-US"/>
+            <a:endParaRPr lang="en-US" dirty="0"/>
           </a:p>
         </p:txBody>
       </p:sp>
@@ -601,7 +605,7 @@
               <a:rPr lang="en-US" smtClean="0"/>
               <a:t>‹nr.›</a:t>
             </a:fld>
-            <a:endParaRPr lang="en-US"/>
+            <a:endParaRPr lang="en-US" dirty="0"/>
           </a:p>
         </p:txBody>
       </p:sp>
@@ -790,7 +794,7 @@
               <a:rPr lang="en-US" smtClean="0"/>
               <a:t>05/03/2017</a:t>
             </a:fld>
-            <a:endParaRPr lang="en-US"/>
+            <a:endParaRPr lang="en-US" dirty="0"/>
           </a:p>
         </p:txBody>
       </p:sp>
@@ -814,7 +818,7 @@
           <a:bodyPr/>
           <a:lstStyle/>
           <a:p>
-            <a:endParaRPr lang="en-US"/>
+            <a:endParaRPr lang="en-US" dirty="0"/>
           </a:p>
         </p:txBody>
       </p:sp>
@@ -842,7 +846,7 @@
               <a:rPr lang="en-US" smtClean="0"/>
               <a:t>‹nr.›</a:t>
             </a:fld>
-            <a:endParaRPr lang="en-US"/>
+            <a:endParaRPr lang="en-US" dirty="0"/>
           </a:p>
         </p:txBody>
       </p:sp>
@@ -1100,7 +1104,7 @@
               <a:rPr lang="en-US" smtClean="0"/>
               <a:t>05/03/2017</a:t>
             </a:fld>
-            <a:endParaRPr lang="en-US"/>
+            <a:endParaRPr lang="en-US" dirty="0"/>
           </a:p>
         </p:txBody>
       </p:sp>
@@ -1124,7 +1128,7 @@
           <a:bodyPr/>
           <a:lstStyle/>
           <a:p>
-            <a:endParaRPr lang="en-US"/>
+            <a:endParaRPr lang="en-US" dirty="0"/>
           </a:p>
         </p:txBody>
       </p:sp>
@@ -1152,7 +1156,7 @@
               <a:rPr lang="en-US" smtClean="0"/>
               <a:t>‹nr.›</a:t>
             </a:fld>
-            <a:endParaRPr lang="en-US"/>
+            <a:endParaRPr lang="en-US" dirty="0"/>
           </a:p>
         </p:txBody>
       </p:sp>
@@ -1573,7 +1577,7 @@
               <a:rPr lang="en-US" smtClean="0"/>
               <a:t>05/03/2017</a:t>
             </a:fld>
-            <a:endParaRPr lang="en-US"/>
+            <a:endParaRPr lang="en-US" dirty="0"/>
           </a:p>
         </p:txBody>
       </p:sp>
@@ -1597,7 +1601,7 @@
           <a:bodyPr/>
           <a:lstStyle/>
           <a:p>
-            <a:endParaRPr lang="en-US"/>
+            <a:endParaRPr lang="en-US" dirty="0"/>
           </a:p>
         </p:txBody>
       </p:sp>
@@ -1625,7 +1629,7 @@
               <a:rPr lang="en-US" smtClean="0"/>
               <a:t>‹nr.›</a:t>
             </a:fld>
-            <a:endParaRPr lang="en-US"/>
+            <a:endParaRPr lang="en-US" dirty="0"/>
           </a:p>
         </p:txBody>
       </p:sp>
@@ -2120,7 +2124,7 @@
               <a:rPr lang="en-US" smtClean="0"/>
               <a:t>05/03/2017</a:t>
             </a:fld>
-            <a:endParaRPr lang="en-US"/>
+            <a:endParaRPr lang="en-US" dirty="0"/>
           </a:p>
         </p:txBody>
       </p:sp>
@@ -2139,7 +2143,7 @@
           <a:bodyPr/>
           <a:lstStyle/>
           <a:p>
-            <a:endParaRPr lang="en-US"/>
+            <a:endParaRPr lang="en-US" dirty="0"/>
           </a:p>
         </p:txBody>
       </p:sp>
@@ -2162,7 +2166,7 @@
               <a:rPr lang="en-US" smtClean="0"/>
               <a:t>‹nr.›</a:t>
             </a:fld>
-            <a:endParaRPr lang="en-US"/>
+            <a:endParaRPr lang="en-US" dirty="0"/>
           </a:p>
         </p:txBody>
       </p:sp>
@@ -2367,7 +2371,7 @@
           </a:lstStyle>
           <a:p>
             <a:r>
-              <a:rPr lang="nl-NL"/>
+              <a:rPr lang="nl-NL" dirty="0"/>
               <a:t>Klik op het pictogram als u een afbeelding wilt toevoegen</a:t>
             </a:r>
             <a:endParaRPr lang="en-US" dirty="0"/>
@@ -2584,7 +2588,7 @@
           </a:lstStyle>
           <a:p>
             <a:r>
-              <a:rPr lang="nl-NL"/>
+              <a:rPr lang="nl-NL" dirty="0"/>
               <a:t>Klik op het pictogram als u een afbeelding wilt toevoegen</a:t>
             </a:r>
             <a:endParaRPr lang="en-US" dirty="0"/>
@@ -2801,7 +2805,7 @@
           </a:lstStyle>
           <a:p>
             <a:r>
-              <a:rPr lang="nl-NL"/>
+              <a:rPr lang="nl-NL" dirty="0"/>
               <a:t>Klik op het pictogram als u een afbeelding wilt toevoegen</a:t>
             </a:r>
             <a:endParaRPr lang="en-US" dirty="0"/>
@@ -2894,7 +2898,7 @@
               <a:rPr lang="en-US" smtClean="0"/>
               <a:t>05/03/2017</a:t>
             </a:fld>
-            <a:endParaRPr lang="en-US"/>
+            <a:endParaRPr lang="en-US" dirty="0"/>
           </a:p>
         </p:txBody>
       </p:sp>
@@ -2913,7 +2917,7 @@
           <a:bodyPr/>
           <a:lstStyle/>
           <a:p>
-            <a:endParaRPr lang="en-US"/>
+            <a:endParaRPr lang="en-US" dirty="0"/>
           </a:p>
         </p:txBody>
       </p:sp>
@@ -2936,7 +2940,7 @@
               <a:rPr lang="en-US" smtClean="0"/>
               <a:t>‹nr.›</a:t>
             </a:fld>
-            <a:endParaRPr lang="en-US"/>
+            <a:endParaRPr lang="en-US" dirty="0"/>
           </a:p>
         </p:txBody>
       </p:sp>
@@ -3069,7 +3073,7 @@
               <a:rPr lang="en-US" smtClean="0"/>
               <a:t>05/03/2017</a:t>
             </a:fld>
-            <a:endParaRPr lang="en-US"/>
+            <a:endParaRPr lang="en-US" dirty="0"/>
           </a:p>
         </p:txBody>
       </p:sp>
@@ -3088,7 +3092,7 @@
           <a:bodyPr/>
           <a:lstStyle/>
           <a:p>
-            <a:endParaRPr lang="en-US"/>
+            <a:endParaRPr lang="en-US" dirty="0"/>
           </a:p>
         </p:txBody>
       </p:sp>
@@ -3111,7 +3115,7 @@
               <a:rPr lang="en-US" smtClean="0"/>
               <a:t>‹nr.›</a:t>
             </a:fld>
-            <a:endParaRPr lang="en-US"/>
+            <a:endParaRPr lang="en-US" dirty="0"/>
           </a:p>
         </p:txBody>
       </p:sp>
@@ -3292,7 +3296,7 @@
               <a:rPr lang="en-US" smtClean="0"/>
               <a:t>05/03/2017</a:t>
             </a:fld>
-            <a:endParaRPr lang="en-US"/>
+            <a:endParaRPr lang="en-US" dirty="0"/>
           </a:p>
         </p:txBody>
       </p:sp>
@@ -3316,7 +3320,7 @@
           <a:bodyPr/>
           <a:lstStyle/>
           <a:p>
-            <a:endParaRPr lang="en-US"/>
+            <a:endParaRPr lang="en-US" dirty="0"/>
           </a:p>
         </p:txBody>
       </p:sp>
@@ -3344,7 +3348,7 @@
               <a:rPr lang="en-US" smtClean="0"/>
               <a:t>‹nr.›</a:t>
             </a:fld>
-            <a:endParaRPr lang="en-US"/>
+            <a:endParaRPr lang="en-US" dirty="0"/>
           </a:p>
         </p:txBody>
       </p:sp>
@@ -3472,7 +3476,7 @@
               <a:rPr lang="en-US" smtClean="0"/>
               <a:t>05/03/2017</a:t>
             </a:fld>
-            <a:endParaRPr lang="en-US"/>
+            <a:endParaRPr lang="en-US" dirty="0"/>
           </a:p>
         </p:txBody>
       </p:sp>
@@ -3491,7 +3495,7 @@
           <a:bodyPr/>
           <a:lstStyle/>
           <a:p>
-            <a:endParaRPr lang="en-US"/>
+            <a:endParaRPr lang="en-US" dirty="0"/>
           </a:p>
         </p:txBody>
       </p:sp>
@@ -3514,7 +3518,7 @@
               <a:rPr lang="en-US" smtClean="0"/>
               <a:t>‹nr.›</a:t>
             </a:fld>
-            <a:endParaRPr lang="en-US"/>
+            <a:endParaRPr lang="en-US" dirty="0"/>
           </a:p>
         </p:txBody>
       </p:sp>
@@ -3761,7 +3765,7 @@
               <a:rPr lang="en-US" smtClean="0"/>
               <a:t>05/03/2017</a:t>
             </a:fld>
-            <a:endParaRPr lang="en-US"/>
+            <a:endParaRPr lang="en-US" dirty="0"/>
           </a:p>
         </p:txBody>
       </p:sp>
@@ -3785,7 +3789,7 @@
           <a:bodyPr/>
           <a:lstStyle/>
           <a:p>
-            <a:endParaRPr lang="en-US"/>
+            <a:endParaRPr lang="en-US" dirty="0"/>
           </a:p>
         </p:txBody>
       </p:sp>
@@ -3813,7 +3817,7 @@
               <a:rPr lang="en-US" smtClean="0"/>
               <a:t>‹nr.›</a:t>
             </a:fld>
-            <a:endParaRPr lang="en-US"/>
+            <a:endParaRPr lang="en-US" dirty="0"/>
           </a:p>
         </p:txBody>
       </p:sp>
@@ -4003,7 +4007,7 @@
               <a:rPr lang="en-US" smtClean="0"/>
               <a:t>05/03/2017</a:t>
             </a:fld>
-            <a:endParaRPr lang="en-US"/>
+            <a:endParaRPr lang="en-US" dirty="0"/>
           </a:p>
         </p:txBody>
       </p:sp>
@@ -4022,7 +4026,7 @@
           <a:bodyPr/>
           <a:lstStyle/>
           <a:p>
-            <a:endParaRPr lang="en-US"/>
+            <a:endParaRPr lang="en-US" dirty="0"/>
           </a:p>
         </p:txBody>
       </p:sp>
@@ -4045,7 +4049,7 @@
               <a:rPr lang="en-US" smtClean="0"/>
               <a:t>‹nr.›</a:t>
             </a:fld>
-            <a:endParaRPr lang="en-US"/>
+            <a:endParaRPr lang="en-US" dirty="0"/>
           </a:p>
         </p:txBody>
       </p:sp>
@@ -4382,7 +4386,7 @@
               <a:rPr lang="en-US" smtClean="0"/>
               <a:t>05/03/2017</a:t>
             </a:fld>
-            <a:endParaRPr lang="en-US"/>
+            <a:endParaRPr lang="en-US" dirty="0"/>
           </a:p>
         </p:txBody>
       </p:sp>
@@ -4401,7 +4405,7 @@
           <a:bodyPr/>
           <a:lstStyle/>
           <a:p>
-            <a:endParaRPr lang="en-US"/>
+            <a:endParaRPr lang="en-US" dirty="0"/>
           </a:p>
         </p:txBody>
       </p:sp>
@@ -4424,7 +4428,7 @@
               <a:rPr lang="en-US" smtClean="0"/>
               <a:t>‹nr.›</a:t>
             </a:fld>
-            <a:endParaRPr lang="en-US"/>
+            <a:endParaRPr lang="en-US" dirty="0"/>
           </a:p>
         </p:txBody>
       </p:sp>
@@ -4500,7 +4504,7 @@
               <a:rPr lang="en-US" smtClean="0"/>
               <a:t>05/03/2017</a:t>
             </a:fld>
-            <a:endParaRPr lang="en-US"/>
+            <a:endParaRPr lang="en-US" dirty="0"/>
           </a:p>
         </p:txBody>
       </p:sp>
@@ -4519,7 +4523,7 @@
           <a:bodyPr/>
           <a:lstStyle/>
           <a:p>
-            <a:endParaRPr lang="en-US"/>
+            <a:endParaRPr lang="en-US" dirty="0"/>
           </a:p>
         </p:txBody>
       </p:sp>
@@ -4542,7 +4546,7 @@
               <a:rPr lang="en-US" smtClean="0"/>
               <a:t>‹nr.›</a:t>
             </a:fld>
-            <a:endParaRPr lang="en-US"/>
+            <a:endParaRPr lang="en-US" dirty="0"/>
           </a:p>
         </p:txBody>
       </p:sp>
@@ -4595,7 +4599,7 @@
               <a:rPr lang="en-US" smtClean="0"/>
               <a:t>05/03/2017</a:t>
             </a:fld>
-            <a:endParaRPr lang="en-US"/>
+            <a:endParaRPr lang="en-US" dirty="0"/>
           </a:p>
         </p:txBody>
       </p:sp>
@@ -4614,7 +4618,7 @@
           <a:bodyPr/>
           <a:lstStyle/>
           <a:p>
-            <a:endParaRPr lang="en-US"/>
+            <a:endParaRPr lang="en-US" dirty="0"/>
           </a:p>
         </p:txBody>
       </p:sp>
@@ -4637,7 +4641,7 @@
               <a:rPr lang="en-US" smtClean="0"/>
               <a:t>‹nr.›</a:t>
             </a:fld>
-            <a:endParaRPr lang="en-US"/>
+            <a:endParaRPr lang="en-US" dirty="0"/>
           </a:p>
         </p:txBody>
       </p:sp>
@@ -4844,7 +4848,7 @@
               <a:rPr lang="en-US" smtClean="0"/>
               <a:t>05/03/2017</a:t>
             </a:fld>
-            <a:endParaRPr lang="en-US"/>
+            <a:endParaRPr lang="en-US" dirty="0"/>
           </a:p>
         </p:txBody>
       </p:sp>
@@ -4863,7 +4867,7 @@
           <a:bodyPr/>
           <a:lstStyle/>
           <a:p>
-            <a:endParaRPr lang="en-US"/>
+            <a:endParaRPr lang="en-US" dirty="0"/>
           </a:p>
         </p:txBody>
       </p:sp>
@@ -4886,7 +4890,7 @@
               <a:rPr lang="en-US" smtClean="0"/>
               <a:t>‹nr.›</a:t>
             </a:fld>
-            <a:endParaRPr lang="en-US"/>
+            <a:endParaRPr lang="en-US" dirty="0"/>
           </a:p>
         </p:txBody>
       </p:sp>
@@ -5010,7 +5014,7 @@
           </a:lstStyle>
           <a:p>
             <a:r>
-              <a:rPr lang="nl-NL"/>
+              <a:rPr lang="nl-NL" dirty="0"/>
               <a:t>Klik op het pictogram als u een afbeelding wilt toevoegen</a:t>
             </a:r>
             <a:endParaRPr lang="en-US" dirty="0"/>
@@ -5101,7 +5105,7 @@
               <a:rPr lang="en-US" smtClean="0"/>
               <a:t>05/03/2017</a:t>
             </a:fld>
-            <a:endParaRPr lang="en-US"/>
+            <a:endParaRPr lang="en-US" dirty="0"/>
           </a:p>
         </p:txBody>
       </p:sp>
@@ -5120,7 +5124,7 @@
           <a:bodyPr/>
           <a:lstStyle/>
           <a:p>
-            <a:endParaRPr lang="en-US"/>
+            <a:endParaRPr lang="en-US" dirty="0"/>
           </a:p>
         </p:txBody>
       </p:sp>
@@ -5143,7 +5147,7 @@
               <a:rPr lang="en-US" smtClean="0"/>
               <a:t>‹nr.›</a:t>
             </a:fld>
-            <a:endParaRPr lang="en-US"/>
+            <a:endParaRPr lang="en-US" dirty="0"/>
           </a:p>
         </p:txBody>
       </p:sp>
@@ -5344,7 +5348,7 @@
               <a:rPr lang="en-US" smtClean="0"/>
               <a:t>05/03/2017</a:t>
             </a:fld>
-            <a:endParaRPr lang="en-US"/>
+            <a:endParaRPr lang="en-US" dirty="0"/>
           </a:p>
         </p:txBody>
       </p:sp>
@@ -5381,7 +5385,7 @@
             </a:lvl1pPr>
           </a:lstStyle>
           <a:p>
-            <a:endParaRPr lang="en-US"/>
+            <a:endParaRPr lang="en-US" dirty="0"/>
           </a:p>
         </p:txBody>
       </p:sp>
@@ -5422,7 +5426,7 @@
               <a:rPr lang="en-US" smtClean="0"/>
               <a:t>‹nr.›</a:t>
             </a:fld>
-            <a:endParaRPr lang="en-US"/>
+            <a:endParaRPr lang="en-US" dirty="0"/>
           </a:p>
         </p:txBody>
       </p:sp>
@@ -6140,39 +6144,382 @@
       </p:sp>
       <p:sp>
         <p:nvSpPr>
-          <p:cNvPr id="3" name="Tijdelijke aanduiding voor inhoud 2"/>
-          <p:cNvSpPr>
-            <a:spLocks noGrp="1"/>
-          </p:cNvSpPr>
-          <p:nvPr>
-            <p:ph sz="half" idx="1"/>
-          </p:nvPr>
-        </p:nvSpPr>
-        <p:spPr/>
-        <p:txBody>
-          <a:bodyPr/>
-          <a:lstStyle/>
-          <a:p>
-            <a:endParaRPr lang="en-US"/>
-          </a:p>
-        </p:txBody>
-      </p:sp>
-      <p:sp>
-        <p:nvSpPr>
-          <p:cNvPr id="4" name="Tijdelijke aanduiding voor inhoud 3"/>
-          <p:cNvSpPr>
-            <a:spLocks noGrp="1"/>
-          </p:cNvSpPr>
-          <p:nvPr>
-            <p:ph sz="half" idx="2"/>
-          </p:nvPr>
-        </p:nvSpPr>
-        <p:spPr/>
-        <p:txBody>
-          <a:bodyPr/>
-          <a:lstStyle/>
-          <a:p>
-            <a:endParaRPr lang="en-US"/>
+          <p:cNvPr id="7" name="Rechthoek: afgeronde hoeken 6"/>
+          <p:cNvSpPr/>
+          <p:nvPr/>
+        </p:nvSpPr>
+        <p:spPr>
+          <a:xfrm>
+            <a:off x="3956108" y="2466792"/>
+            <a:ext cx="2055303" cy="1132514"/>
+          </a:xfrm>
+          <a:prstGeom prst="roundRect">
+            <a:avLst/>
+          </a:prstGeom>
+        </p:spPr>
+        <p:style>
+          <a:lnRef idx="2">
+            <a:schemeClr val="accent1">
+              <a:shade val="50000"/>
+            </a:schemeClr>
+          </a:lnRef>
+          <a:fillRef idx="1">
+            <a:schemeClr val="accent1"/>
+          </a:fillRef>
+          <a:effectRef idx="0">
+            <a:schemeClr val="accent1"/>
+          </a:effectRef>
+          <a:fontRef idx="minor">
+            <a:schemeClr val="lt1"/>
+          </a:fontRef>
+        </p:style>
+        <p:txBody>
+          <a:bodyPr rtlCol="0" anchor="ctr"/>
+          <a:lstStyle/>
+          <a:p>
+            <a:pPr algn="ctr"/>
+            <a:r>
+              <a:rPr lang="en-US" dirty="0"/>
+              <a:t>Order</a:t>
+            </a:r>
+          </a:p>
+        </p:txBody>
+      </p:sp>
+      <p:cxnSp>
+        <p:nvCxnSpPr>
+          <p:cNvPr id="9" name="Rechte verbindingslijn met pijl 8"/>
+          <p:cNvCxnSpPr>
+            <a:stCxn id="7" idx="2"/>
+            <a:endCxn id="6" idx="0"/>
+          </p:cNvCxnSpPr>
+          <p:nvPr/>
+        </p:nvCxnSpPr>
+        <p:spPr>
+          <a:xfrm>
+            <a:off x="4983760" y="3599306"/>
+            <a:ext cx="0" cy="1002643"/>
+          </a:xfrm>
+          <a:prstGeom prst="straightConnector1">
+            <a:avLst/>
+          </a:prstGeom>
+          <a:ln>
+            <a:tailEnd type="triangle"/>
+          </a:ln>
+        </p:spPr>
+        <p:style>
+          <a:lnRef idx="1">
+            <a:schemeClr val="accent1"/>
+          </a:lnRef>
+          <a:fillRef idx="0">
+            <a:schemeClr val="accent1"/>
+          </a:fillRef>
+          <a:effectRef idx="0">
+            <a:schemeClr val="accent1"/>
+          </a:effectRef>
+          <a:fontRef idx="minor">
+            <a:schemeClr val="tx1"/>
+          </a:fontRef>
+        </p:style>
+      </p:cxnSp>
+      <p:cxnSp>
+        <p:nvCxnSpPr>
+          <p:cNvPr id="11" name="Rechte verbindingslijn met pijl 10"/>
+          <p:cNvCxnSpPr>
+            <a:stCxn id="7" idx="3"/>
+            <a:endCxn id="5" idx="1"/>
+          </p:cNvCxnSpPr>
+          <p:nvPr/>
+        </p:nvCxnSpPr>
+        <p:spPr>
+          <a:xfrm>
+            <a:off x="6011411" y="3033049"/>
+            <a:ext cx="1958131" cy="0"/>
+          </a:xfrm>
+          <a:prstGeom prst="straightConnector1">
+            <a:avLst/>
+          </a:prstGeom>
+          <a:ln>
+            <a:tailEnd type="triangle"/>
+          </a:ln>
+        </p:spPr>
+        <p:style>
+          <a:lnRef idx="1">
+            <a:schemeClr val="accent1"/>
+          </a:lnRef>
+          <a:fillRef idx="0">
+            <a:schemeClr val="accent1"/>
+          </a:fillRef>
+          <a:effectRef idx="0">
+            <a:schemeClr val="accent1"/>
+          </a:effectRef>
+          <a:fontRef idx="minor">
+            <a:schemeClr val="tx1"/>
+          </a:fontRef>
+        </p:style>
+      </p:cxnSp>
+      <p:grpSp>
+        <p:nvGrpSpPr>
+          <p:cNvPr id="18" name="Groep 17"/>
+          <p:cNvGrpSpPr/>
+          <p:nvPr/>
+        </p:nvGrpSpPr>
+        <p:grpSpPr>
+          <a:xfrm>
+            <a:off x="3956108" y="4601949"/>
+            <a:ext cx="3232559" cy="2055844"/>
+            <a:chOff x="773184" y="4682455"/>
+            <a:chExt cx="3232559" cy="2055844"/>
+          </a:xfrm>
+        </p:grpSpPr>
+        <p:sp>
+          <p:nvSpPr>
+            <p:cNvPr id="6" name="Rechthoek: afgeronde hoeken 5"/>
+            <p:cNvSpPr/>
+            <p:nvPr/>
+          </p:nvSpPr>
+          <p:spPr>
+            <a:xfrm>
+              <a:off x="773184" y="4682455"/>
+              <a:ext cx="2055303" cy="1132514"/>
+            </a:xfrm>
+            <a:prstGeom prst="roundRect">
+              <a:avLst/>
+            </a:prstGeom>
+          </p:spPr>
+          <p:style>
+            <a:lnRef idx="2">
+              <a:schemeClr val="accent1">
+                <a:shade val="50000"/>
+              </a:schemeClr>
+            </a:lnRef>
+            <a:fillRef idx="1">
+              <a:schemeClr val="accent1"/>
+            </a:fillRef>
+            <a:effectRef idx="0">
+              <a:schemeClr val="accent1"/>
+            </a:effectRef>
+            <a:fontRef idx="minor">
+              <a:schemeClr val="lt1"/>
+            </a:fontRef>
+          </p:style>
+          <p:txBody>
+            <a:bodyPr rtlCol="0" anchor="ctr"/>
+            <a:lstStyle/>
+            <a:p>
+              <a:pPr algn="ctr"/>
+              <a:r>
+                <a:rPr lang="en-US" dirty="0"/>
+                <a:t>Warehouse</a:t>
+              </a:r>
+            </a:p>
+          </p:txBody>
+        </p:sp>
+        <p:sp>
+          <p:nvSpPr>
+            <p:cNvPr id="12" name="Tekstvak 11"/>
+            <p:cNvSpPr txBox="1"/>
+            <p:nvPr/>
+          </p:nvSpPr>
+          <p:spPr>
+            <a:xfrm>
+              <a:off x="773184" y="5814969"/>
+              <a:ext cx="3232559" cy="923330"/>
+            </a:xfrm>
+            <a:prstGeom prst="rect">
+              <a:avLst/>
+            </a:prstGeom>
+            <a:noFill/>
+          </p:spPr>
+          <p:txBody>
+            <a:bodyPr wrap="square" rtlCol="0">
+              <a:spAutoFit/>
+            </a:bodyPr>
+            <a:lstStyle/>
+            <a:p>
+              <a:pPr marL="285750" indent="-285750">
+                <a:buFont typeface="Arial" panose="020B0604020202020204" pitchFamily="34" charset="0"/>
+                <a:buChar char="•"/>
+              </a:pPr>
+              <a:r>
+                <a:rPr lang="en-US" dirty="0" err="1"/>
+                <a:t>shipOrder</a:t>
+              </a:r>
+              <a:r>
+                <a:rPr lang="en-US" dirty="0"/>
+                <a:t> (JMS)</a:t>
+              </a:r>
+            </a:p>
+            <a:p>
+              <a:pPr marL="285750" indent="-285750">
+                <a:buFont typeface="Arial" panose="020B0604020202020204" pitchFamily="34" charset="0"/>
+                <a:buChar char="•"/>
+              </a:pPr>
+              <a:r>
+                <a:rPr lang="en-US" dirty="0" err="1"/>
+                <a:t>getInventory</a:t>
+              </a:r>
+              <a:r>
+                <a:rPr lang="en-US" dirty="0"/>
+                <a:t> (REST)</a:t>
+              </a:r>
+            </a:p>
+            <a:p>
+              <a:pPr marL="285750" indent="-285750">
+                <a:buFont typeface="Arial" panose="020B0604020202020204" pitchFamily="34" charset="0"/>
+                <a:buChar char="•"/>
+              </a:pPr>
+              <a:endParaRPr lang="en-US" dirty="0"/>
+            </a:p>
+          </p:txBody>
+        </p:sp>
+      </p:grpSp>
+      <p:grpSp>
+        <p:nvGrpSpPr>
+          <p:cNvPr id="19" name="Groep 18"/>
+          <p:cNvGrpSpPr/>
+          <p:nvPr/>
+        </p:nvGrpSpPr>
+        <p:grpSpPr>
+          <a:xfrm>
+            <a:off x="7969542" y="2466792"/>
+            <a:ext cx="3232559" cy="2052935"/>
+            <a:chOff x="8296711" y="2484539"/>
+            <a:chExt cx="3232559" cy="2052935"/>
+          </a:xfrm>
+        </p:grpSpPr>
+        <p:sp>
+          <p:nvSpPr>
+            <p:cNvPr id="5" name="Rechthoek: afgeronde hoeken 4"/>
+            <p:cNvSpPr/>
+            <p:nvPr/>
+          </p:nvSpPr>
+          <p:spPr>
+            <a:xfrm>
+              <a:off x="8296711" y="2484539"/>
+              <a:ext cx="2055303" cy="1132514"/>
+            </a:xfrm>
+            <a:prstGeom prst="roundRect">
+              <a:avLst/>
+            </a:prstGeom>
+          </p:spPr>
+          <p:style>
+            <a:lnRef idx="2">
+              <a:schemeClr val="accent1">
+                <a:shade val="50000"/>
+              </a:schemeClr>
+            </a:lnRef>
+            <a:fillRef idx="1">
+              <a:schemeClr val="accent1"/>
+            </a:fillRef>
+            <a:effectRef idx="0">
+              <a:schemeClr val="accent1"/>
+            </a:effectRef>
+            <a:fontRef idx="minor">
+              <a:schemeClr val="lt1"/>
+            </a:fontRef>
+          </p:style>
+          <p:txBody>
+            <a:bodyPr rtlCol="0" anchor="ctr"/>
+            <a:lstStyle/>
+            <a:p>
+              <a:pPr algn="ctr"/>
+              <a:r>
+                <a:rPr lang="en-US" dirty="0"/>
+                <a:t>Finance</a:t>
+              </a:r>
+            </a:p>
+          </p:txBody>
+        </p:sp>
+        <p:sp>
+          <p:nvSpPr>
+            <p:cNvPr id="15" name="Tekstvak 14"/>
+            <p:cNvSpPr txBox="1"/>
+            <p:nvPr/>
+          </p:nvSpPr>
+          <p:spPr>
+            <a:xfrm>
+              <a:off x="8296711" y="3614144"/>
+              <a:ext cx="3232559" cy="923330"/>
+            </a:xfrm>
+            <a:prstGeom prst="rect">
+              <a:avLst/>
+            </a:prstGeom>
+            <a:noFill/>
+          </p:spPr>
+          <p:txBody>
+            <a:bodyPr wrap="square" rtlCol="0">
+              <a:spAutoFit/>
+            </a:bodyPr>
+            <a:lstStyle/>
+            <a:p>
+              <a:pPr marL="285750" indent="-285750">
+                <a:buFont typeface="Arial" panose="020B0604020202020204" pitchFamily="34" charset="0"/>
+                <a:buChar char="•"/>
+              </a:pPr>
+              <a:r>
+                <a:rPr lang="en-US" dirty="0" err="1"/>
+                <a:t>sendInvoice</a:t>
+              </a:r>
+              <a:r>
+                <a:rPr lang="en-US" dirty="0"/>
+                <a:t> (JMS)</a:t>
+              </a:r>
+            </a:p>
+            <a:p>
+              <a:pPr marL="285750" indent="-285750">
+                <a:buFont typeface="Arial" panose="020B0604020202020204" pitchFamily="34" charset="0"/>
+                <a:buChar char="•"/>
+              </a:pPr>
+              <a:r>
+                <a:rPr lang="en-US" dirty="0" err="1"/>
+                <a:t>executePayment</a:t>
+              </a:r>
+              <a:r>
+                <a:rPr lang="en-US" dirty="0"/>
+                <a:t> (JMS)</a:t>
+              </a:r>
+            </a:p>
+            <a:p>
+              <a:pPr marL="285750" indent="-285750">
+                <a:buFont typeface="Arial" panose="020B0604020202020204" pitchFamily="34" charset="0"/>
+                <a:buChar char="•"/>
+              </a:pPr>
+              <a:endParaRPr lang="en-US" dirty="0"/>
+            </a:p>
+          </p:txBody>
+        </p:sp>
+      </p:grpSp>
+      <p:sp>
+        <p:nvSpPr>
+          <p:cNvPr id="20" name="Tekstvak 19"/>
+          <p:cNvSpPr txBox="1"/>
+          <p:nvPr/>
+        </p:nvSpPr>
+        <p:spPr>
+          <a:xfrm>
+            <a:off x="1778466" y="2650697"/>
+            <a:ext cx="2088860" cy="369332"/>
+          </a:xfrm>
+          <a:prstGeom prst="rect">
+            <a:avLst/>
+          </a:prstGeom>
+          <a:noFill/>
+        </p:spPr>
+        <p:txBody>
+          <a:bodyPr wrap="square" rtlCol="0">
+            <a:spAutoFit/>
+          </a:bodyPr>
+          <a:lstStyle/>
+          <a:p>
+            <a:pPr marL="285750" indent="-285750" algn="r">
+              <a:buFont typeface="Arial" panose="020B0604020202020204" pitchFamily="34" charset="0"/>
+              <a:buChar char="•"/>
+            </a:pPr>
+            <a:r>
+              <a:rPr lang="en-US" dirty="0" err="1"/>
+              <a:t>executeOrder</a:t>
+            </a:r>
+            <a:endParaRPr lang="en-US" dirty="0"/>
           </a:p>
         </p:txBody>
       </p:sp>
@@ -6223,6 +6570,411 @@
           <a:p>
             <a:r>
               <a:rPr lang="en-US" dirty="0"/>
+              <a:t>Applications</a:t>
+            </a:r>
+          </a:p>
+        </p:txBody>
+      </p:sp>
+      <p:sp>
+        <p:nvSpPr>
+          <p:cNvPr id="7" name="Tijdelijke aanduiding voor tekst 6"/>
+          <p:cNvSpPr>
+            <a:spLocks noGrp="1"/>
+          </p:cNvSpPr>
+          <p:nvPr>
+            <p:ph type="body" sz="half" idx="18"/>
+          </p:nvPr>
+        </p:nvSpPr>
+        <p:spPr>
+          <a:xfrm>
+            <a:off x="688618" y="4278386"/>
+            <a:ext cx="3451582" cy="1940300"/>
+          </a:xfrm>
+        </p:spPr>
+        <p:txBody>
+          <a:bodyPr>
+            <a:normAutofit/>
+          </a:bodyPr>
+          <a:lstStyle/>
+          <a:p>
+            <a:pPr marL="285750" indent="-285750">
+              <a:buFont typeface="Arial" panose="020B0604020202020204" pitchFamily="34" charset="0"/>
+              <a:buChar char="•"/>
+            </a:pPr>
+            <a:r>
+              <a:rPr lang="en-US" dirty="0"/>
+              <a:t>Spring Boot-style application:</a:t>
+            </a:r>
+          </a:p>
+          <a:p>
+            <a:pPr marL="742950" lvl="1" indent="-285750">
+              <a:buFont typeface="Arial" panose="020B0604020202020204" pitchFamily="34" charset="0"/>
+              <a:buChar char="•"/>
+            </a:pPr>
+            <a:r>
+              <a:rPr lang="en-US" dirty="0"/>
+              <a:t>Use of Spring Boot starters</a:t>
+            </a:r>
+          </a:p>
+          <a:p>
+            <a:pPr marL="742950" lvl="1" indent="-285750">
+              <a:buFont typeface="Arial" panose="020B0604020202020204" pitchFamily="34" charset="0"/>
+              <a:buChar char="•"/>
+            </a:pPr>
+            <a:r>
+              <a:rPr lang="en-US" dirty="0"/>
+              <a:t>Automatic configuration of JTA &amp; JMS</a:t>
+            </a:r>
+          </a:p>
+          <a:p>
+            <a:pPr marL="285750" indent="-285750">
+              <a:buFont typeface="Arial" panose="020B0604020202020204" pitchFamily="34" charset="0"/>
+              <a:buChar char="•"/>
+            </a:pPr>
+            <a:r>
+              <a:rPr lang="en-US" dirty="0"/>
+              <a:t>Manual JPA (</a:t>
+            </a:r>
+            <a:r>
+              <a:rPr lang="en-US" dirty="0" err="1"/>
+              <a:t>Eclipselink</a:t>
+            </a:r>
+            <a:r>
+              <a:rPr lang="en-US" dirty="0"/>
+              <a:t>) config</a:t>
+            </a:r>
+          </a:p>
+          <a:p>
+            <a:pPr marL="285750" indent="-285750">
+              <a:buFont typeface="Arial" panose="020B0604020202020204" pitchFamily="34" charset="0"/>
+              <a:buChar char="•"/>
+            </a:pPr>
+            <a:r>
+              <a:rPr lang="en-US" dirty="0"/>
+              <a:t>Application-local implementation of storing JMS messages</a:t>
+            </a:r>
+          </a:p>
+          <a:p>
+            <a:pPr marL="742950" lvl="1" indent="-285750">
+              <a:buFont typeface="Arial" panose="020B0604020202020204" pitchFamily="34" charset="0"/>
+              <a:buChar char="•"/>
+            </a:pPr>
+            <a:endParaRPr lang="en-US" dirty="0"/>
+          </a:p>
+        </p:txBody>
+      </p:sp>
+      <p:sp>
+        <p:nvSpPr>
+          <p:cNvPr id="8" name="Tijdelijke aanduiding voor tekst 7"/>
+          <p:cNvSpPr>
+            <a:spLocks noGrp="1"/>
+          </p:cNvSpPr>
+          <p:nvPr>
+            <p:ph type="body" sz="half" idx="19"/>
+          </p:nvPr>
+        </p:nvSpPr>
+        <p:spPr>
+          <a:xfrm>
+            <a:off x="4374261" y="4278386"/>
+            <a:ext cx="3448935" cy="1940296"/>
+          </a:xfrm>
+        </p:spPr>
+        <p:txBody>
+          <a:bodyPr>
+            <a:normAutofit/>
+          </a:bodyPr>
+          <a:lstStyle/>
+          <a:p>
+            <a:pPr marL="285750" indent="-285750">
+              <a:buFont typeface="Arial" panose="020B0604020202020204" pitchFamily="34" charset="0"/>
+              <a:buChar char="•"/>
+            </a:pPr>
+            <a:r>
+              <a:rPr lang="en-US" dirty="0"/>
+              <a:t>Old-style application : </a:t>
+            </a:r>
+          </a:p>
+          <a:p>
+            <a:pPr marL="742950" lvl="1" indent="-285750">
+              <a:buFont typeface="Arial" panose="020B0604020202020204" pitchFamily="34" charset="0"/>
+              <a:buChar char="•"/>
+            </a:pPr>
+            <a:r>
+              <a:rPr lang="en-US" dirty="0"/>
+              <a:t>XML spring configuration</a:t>
+            </a:r>
+          </a:p>
+          <a:p>
+            <a:pPr marL="742950" lvl="1" indent="-285750">
+              <a:buFont typeface="Arial" panose="020B0604020202020204" pitchFamily="34" charset="0"/>
+              <a:buChar char="•"/>
+            </a:pPr>
+            <a:r>
+              <a:rPr lang="en-US" dirty="0"/>
+              <a:t>Manual JTA config</a:t>
+            </a:r>
+          </a:p>
+          <a:p>
+            <a:pPr marL="742950" lvl="1" indent="-285750">
+              <a:buFont typeface="Arial" panose="020B0604020202020204" pitchFamily="34" charset="0"/>
+              <a:buChar char="•"/>
+            </a:pPr>
+            <a:r>
+              <a:rPr lang="en-US" dirty="0"/>
+              <a:t>Manual JPA (</a:t>
+            </a:r>
+            <a:r>
+              <a:rPr lang="en-US" dirty="0" err="1"/>
+              <a:t>Eclipselink</a:t>
+            </a:r>
+            <a:r>
+              <a:rPr lang="en-US" dirty="0"/>
+              <a:t>) config</a:t>
+            </a:r>
+          </a:p>
+          <a:p>
+            <a:pPr marL="742950" lvl="1" indent="-285750">
+              <a:buFont typeface="Arial" panose="020B0604020202020204" pitchFamily="34" charset="0"/>
+              <a:buChar char="•"/>
+            </a:pPr>
+            <a:r>
+              <a:rPr lang="en-US" dirty="0"/>
+              <a:t>Manual JMS config</a:t>
+            </a:r>
+          </a:p>
+          <a:p>
+            <a:pPr marL="285750" indent="-285750">
+              <a:buFont typeface="Arial" panose="020B0604020202020204" pitchFamily="34" charset="0"/>
+              <a:buChar char="•"/>
+            </a:pPr>
+            <a:r>
+              <a:rPr lang="en-US" dirty="0"/>
+              <a:t>Application-local implementation of storing JMS messages</a:t>
+            </a:r>
+          </a:p>
+          <a:p>
+            <a:pPr marL="742950" lvl="1" indent="-285750">
+              <a:buFont typeface="Arial" panose="020B0604020202020204" pitchFamily="34" charset="0"/>
+              <a:buChar char="•"/>
+            </a:pPr>
+            <a:endParaRPr lang="en-US" dirty="0"/>
+          </a:p>
+          <a:p>
+            <a:pPr marL="742950" lvl="1" indent="-285750">
+              <a:buFont typeface="Arial" panose="020B0604020202020204" pitchFamily="34" charset="0"/>
+              <a:buChar char="•"/>
+            </a:pPr>
+            <a:endParaRPr lang="en-US" dirty="0"/>
+          </a:p>
+          <a:p>
+            <a:pPr marL="285750" indent="-285750">
+              <a:buFont typeface="Arial" panose="020B0604020202020204" pitchFamily="34" charset="0"/>
+              <a:buChar char="•"/>
+            </a:pPr>
+            <a:endParaRPr lang="en-US" dirty="0"/>
+          </a:p>
+        </p:txBody>
+      </p:sp>
+      <p:sp>
+        <p:nvSpPr>
+          <p:cNvPr id="11" name="Tijdelijke aanduiding voor tekst 10"/>
+          <p:cNvSpPr>
+            <a:spLocks noGrp="1"/>
+          </p:cNvSpPr>
+          <p:nvPr>
+            <p:ph type="body" sz="half" idx="20"/>
+          </p:nvPr>
+        </p:nvSpPr>
+        <p:spPr>
+          <a:xfrm>
+            <a:off x="8049731" y="4278387"/>
+            <a:ext cx="3452445" cy="1940296"/>
+          </a:xfrm>
+        </p:spPr>
+        <p:txBody>
+          <a:bodyPr/>
+          <a:lstStyle/>
+          <a:p>
+            <a:endParaRPr lang="en-US" dirty="0"/>
+          </a:p>
+        </p:txBody>
+      </p:sp>
+      <p:sp>
+        <p:nvSpPr>
+          <p:cNvPr id="14" name="Rechthoek: afgeronde hoeken 13"/>
+          <p:cNvSpPr/>
+          <p:nvPr/>
+        </p:nvSpPr>
+        <p:spPr>
+          <a:xfrm>
+            <a:off x="5071078" y="2557943"/>
+            <a:ext cx="2055303" cy="1132514"/>
+          </a:xfrm>
+          <a:prstGeom prst="roundRect">
+            <a:avLst/>
+          </a:prstGeom>
+        </p:spPr>
+        <p:style>
+          <a:lnRef idx="2">
+            <a:schemeClr val="accent1">
+              <a:shade val="50000"/>
+            </a:schemeClr>
+          </a:lnRef>
+          <a:fillRef idx="1">
+            <a:schemeClr val="accent1"/>
+          </a:fillRef>
+          <a:effectRef idx="0">
+            <a:schemeClr val="accent1"/>
+          </a:effectRef>
+          <a:fontRef idx="minor">
+            <a:schemeClr val="lt1"/>
+          </a:fontRef>
+        </p:style>
+        <p:txBody>
+          <a:bodyPr rtlCol="0" anchor="ctr"/>
+          <a:lstStyle/>
+          <a:p>
+            <a:pPr algn="ctr"/>
+            <a:r>
+              <a:rPr lang="en-US" dirty="0"/>
+              <a:t>Warehouse</a:t>
+            </a:r>
+          </a:p>
+        </p:txBody>
+      </p:sp>
+      <p:sp>
+        <p:nvSpPr>
+          <p:cNvPr id="15" name="Rechthoek: afgeronde hoeken 14"/>
+          <p:cNvSpPr/>
+          <p:nvPr/>
+        </p:nvSpPr>
+        <p:spPr>
+          <a:xfrm>
+            <a:off x="8746142" y="2491959"/>
+            <a:ext cx="2055303" cy="1132514"/>
+          </a:xfrm>
+          <a:prstGeom prst="roundRect">
+            <a:avLst/>
+          </a:prstGeom>
+        </p:spPr>
+        <p:style>
+          <a:lnRef idx="2">
+            <a:schemeClr val="accent1">
+              <a:shade val="50000"/>
+            </a:schemeClr>
+          </a:lnRef>
+          <a:fillRef idx="1">
+            <a:schemeClr val="accent1"/>
+          </a:fillRef>
+          <a:effectRef idx="0">
+            <a:schemeClr val="accent1"/>
+          </a:effectRef>
+          <a:fontRef idx="minor">
+            <a:schemeClr val="lt1"/>
+          </a:fontRef>
+        </p:style>
+        <p:txBody>
+          <a:bodyPr rtlCol="0" anchor="ctr"/>
+          <a:lstStyle/>
+          <a:p>
+            <a:pPr algn="ctr"/>
+            <a:r>
+              <a:rPr lang="en-US" dirty="0"/>
+              <a:t>Order</a:t>
+            </a:r>
+          </a:p>
+        </p:txBody>
+      </p:sp>
+      <p:sp>
+        <p:nvSpPr>
+          <p:cNvPr id="16" name="Rechthoek: afgeronde hoeken 15"/>
+          <p:cNvSpPr/>
+          <p:nvPr/>
+        </p:nvSpPr>
+        <p:spPr>
+          <a:xfrm>
+            <a:off x="1386757" y="2557943"/>
+            <a:ext cx="2055303" cy="1132514"/>
+          </a:xfrm>
+          <a:prstGeom prst="roundRect">
+            <a:avLst/>
+          </a:prstGeom>
+        </p:spPr>
+        <p:style>
+          <a:lnRef idx="2">
+            <a:schemeClr val="accent1">
+              <a:shade val="50000"/>
+            </a:schemeClr>
+          </a:lnRef>
+          <a:fillRef idx="1">
+            <a:schemeClr val="accent1"/>
+          </a:fillRef>
+          <a:effectRef idx="0">
+            <a:schemeClr val="accent1"/>
+          </a:effectRef>
+          <a:fontRef idx="minor">
+            <a:schemeClr val="lt1"/>
+          </a:fontRef>
+        </p:style>
+        <p:txBody>
+          <a:bodyPr rtlCol="0" anchor="ctr"/>
+          <a:lstStyle/>
+          <a:p>
+            <a:pPr algn="ctr"/>
+            <a:r>
+              <a:rPr lang="en-US" dirty="0"/>
+              <a:t>Finance</a:t>
+            </a:r>
+          </a:p>
+        </p:txBody>
+      </p:sp>
+    </p:spTree>
+    <p:extLst>
+      <p:ext uri="{BB962C8B-B14F-4D97-AF65-F5344CB8AC3E}">
+        <p14:creationId xmlns:p14="http://schemas.microsoft.com/office/powerpoint/2010/main" val="3998984135"/>
+      </p:ext>
+    </p:extLst>
+  </p:cSld>
+  <p:clrMapOvr>
+    <a:masterClrMapping/>
+  </p:clrMapOvr>
+</p:sld>
+</file>
+
+<file path=ppt/slides/slide6.xml><?xml version="1.0" encoding="utf-8"?>
+<p:sld xmlns:a="http://schemas.openxmlformats.org/drawingml/2006/main" xmlns:r="http://schemas.openxmlformats.org/officeDocument/2006/relationships" xmlns:p="http://schemas.openxmlformats.org/presentationml/2006/main">
+  <p:cSld>
+    <p:spTree>
+      <p:nvGrpSpPr>
+        <p:cNvPr id="1" name=""/>
+        <p:cNvGrpSpPr/>
+        <p:nvPr/>
+      </p:nvGrpSpPr>
+      <p:grpSpPr>
+        <a:xfrm>
+          <a:off x="0" y="0"/>
+          <a:ext cx="0" cy="0"/>
+          <a:chOff x="0" y="0"/>
+          <a:chExt cx="0" cy="0"/>
+        </a:xfrm>
+      </p:grpSpPr>
+      <p:sp>
+        <p:nvSpPr>
+          <p:cNvPr id="2" name="Titel 1"/>
+          <p:cNvSpPr>
+            <a:spLocks noGrp="1"/>
+          </p:cNvSpPr>
+          <p:nvPr>
+            <p:ph type="title"/>
+          </p:nvPr>
+        </p:nvSpPr>
+        <p:spPr/>
+        <p:txBody>
+          <a:bodyPr/>
+          <a:lstStyle/>
+          <a:p>
+            <a:r>
+              <a:rPr lang="en-US" dirty="0"/>
               <a:t>Requirements</a:t>
             </a:r>
           </a:p>
@@ -6250,6 +7002,28 @@
             <a:r>
               <a:rPr lang="en-US" dirty="0"/>
               <a:t> needs to be stored, so it can be traced&amp; resent if needed</a:t>
+            </a:r>
+          </a:p>
+          <a:p>
+            <a:r>
+              <a:rPr lang="en-US" dirty="0" err="1"/>
+              <a:t>Eclipselink</a:t>
+            </a:r>
+            <a:r>
+              <a:rPr lang="en-US" dirty="0"/>
+              <a:t> is the JPA implementation of choice</a:t>
+            </a:r>
+          </a:p>
+          <a:p>
+            <a:r>
+              <a:rPr lang="en-US" dirty="0"/>
+              <a:t>Uniform set of libraries across organization</a:t>
+            </a:r>
+          </a:p>
+          <a:p>
+            <a:r>
+              <a:rPr lang="en-US" dirty="0"/>
+              <a:t>Centralized control of shared entities</a:t>
             </a:r>
           </a:p>
         </p:txBody>
@@ -6258,6 +7032,261 @@
     <p:extLst>
       <p:ext uri="{BB962C8B-B14F-4D97-AF65-F5344CB8AC3E}">
         <p14:creationId xmlns:p14="http://schemas.microsoft.com/office/powerpoint/2010/main" val="3580390359"/>
+      </p:ext>
+    </p:extLst>
+  </p:cSld>
+  <p:clrMapOvr>
+    <a:masterClrMapping/>
+  </p:clrMapOvr>
+</p:sld>
+</file>
+
+<file path=ppt/slides/slide7.xml><?xml version="1.0" encoding="utf-8"?>
+<p:sld xmlns:a="http://schemas.openxmlformats.org/drawingml/2006/main" xmlns:r="http://schemas.openxmlformats.org/officeDocument/2006/relationships" xmlns:p="http://schemas.openxmlformats.org/presentationml/2006/main">
+  <p:cSld>
+    <p:spTree>
+      <p:nvGrpSpPr>
+        <p:cNvPr id="1" name=""/>
+        <p:cNvGrpSpPr/>
+        <p:nvPr/>
+      </p:nvGrpSpPr>
+      <p:grpSpPr>
+        <a:xfrm>
+          <a:off x="0" y="0"/>
+          <a:ext cx="0" cy="0"/>
+          <a:chOff x="0" y="0"/>
+          <a:chExt cx="0" cy="0"/>
+        </a:xfrm>
+      </p:grpSpPr>
+      <p:sp>
+        <p:nvSpPr>
+          <p:cNvPr id="2" name="Titel 1"/>
+          <p:cNvSpPr>
+            <a:spLocks noGrp="1"/>
+          </p:cNvSpPr>
+          <p:nvPr>
+            <p:ph type="title"/>
+          </p:nvPr>
+        </p:nvSpPr>
+        <p:spPr/>
+        <p:txBody>
+          <a:bodyPr/>
+          <a:lstStyle/>
+          <a:p>
+            <a:r>
+              <a:rPr lang="en-US" dirty="0"/>
+              <a:t>Lab 1: centralize stack</a:t>
+            </a:r>
+          </a:p>
+        </p:txBody>
+      </p:sp>
+      <p:sp>
+        <p:nvSpPr>
+          <p:cNvPr id="3" name="Tijdelijke aanduiding voor inhoud 2"/>
+          <p:cNvSpPr>
+            <a:spLocks noGrp="1"/>
+          </p:cNvSpPr>
+          <p:nvPr>
+            <p:ph idx="1"/>
+          </p:nvPr>
+        </p:nvSpPr>
+        <p:spPr/>
+        <p:txBody>
+          <a:bodyPr/>
+          <a:lstStyle/>
+          <a:p>
+            <a:r>
+              <a:rPr lang="en-US" dirty="0"/>
+              <a:t>Step 1: Create a commons library framework</a:t>
+            </a:r>
+          </a:p>
+          <a:p>
+            <a:endParaRPr lang="en-US" dirty="0"/>
+          </a:p>
+          <a:p>
+            <a:r>
+              <a:rPr lang="en-US" dirty="0"/>
+              <a:t>Step 2: Make the framework build on the Spring Boot stack (adding to dependency management where necessary)</a:t>
+            </a:r>
+          </a:p>
+          <a:p>
+            <a:endParaRPr lang="en-US" dirty="0"/>
+          </a:p>
+          <a:p>
+            <a:r>
+              <a:rPr lang="en-US" dirty="0"/>
+              <a:t>Step 3: Create common starters to decouple from Spring Boot’s defaults</a:t>
+            </a:r>
+          </a:p>
+        </p:txBody>
+      </p:sp>
+    </p:spTree>
+    <p:extLst>
+      <p:ext uri="{BB962C8B-B14F-4D97-AF65-F5344CB8AC3E}">
+        <p14:creationId xmlns:p14="http://schemas.microsoft.com/office/powerpoint/2010/main" val="2910224620"/>
+      </p:ext>
+    </p:extLst>
+  </p:cSld>
+  <p:clrMapOvr>
+    <a:masterClrMapping/>
+  </p:clrMapOvr>
+</p:sld>
+</file>
+
+<file path=ppt/slides/slide8.xml><?xml version="1.0" encoding="utf-8"?>
+<p:sld xmlns:a="http://schemas.openxmlformats.org/drawingml/2006/main" xmlns:r="http://schemas.openxmlformats.org/officeDocument/2006/relationships" xmlns:p="http://schemas.openxmlformats.org/presentationml/2006/main">
+  <p:cSld>
+    <p:spTree>
+      <p:nvGrpSpPr>
+        <p:cNvPr id="1" name=""/>
+        <p:cNvGrpSpPr/>
+        <p:nvPr/>
+      </p:nvGrpSpPr>
+      <p:grpSpPr>
+        <a:xfrm>
+          <a:off x="0" y="0"/>
+          <a:ext cx="0" cy="0"/>
+          <a:chOff x="0" y="0"/>
+          <a:chExt cx="0" cy="0"/>
+        </a:xfrm>
+      </p:grpSpPr>
+      <p:sp>
+        <p:nvSpPr>
+          <p:cNvPr id="2" name="Titel 1"/>
+          <p:cNvSpPr>
+            <a:spLocks noGrp="1"/>
+          </p:cNvSpPr>
+          <p:nvPr>
+            <p:ph type="title"/>
+          </p:nvPr>
+        </p:nvSpPr>
+        <p:spPr/>
+        <p:txBody>
+          <a:bodyPr/>
+          <a:lstStyle/>
+          <a:p>
+            <a:r>
+              <a:rPr lang="en-US" dirty="0"/>
+              <a:t>LAB 2: Centralize entities</a:t>
+            </a:r>
+          </a:p>
+        </p:txBody>
+      </p:sp>
+      <p:sp>
+        <p:nvSpPr>
+          <p:cNvPr id="3" name="Tijdelijke aanduiding voor inhoud 2"/>
+          <p:cNvSpPr>
+            <a:spLocks noGrp="1"/>
+          </p:cNvSpPr>
+          <p:nvPr>
+            <p:ph idx="1"/>
+          </p:nvPr>
+        </p:nvSpPr>
+        <p:spPr/>
+        <p:txBody>
+          <a:bodyPr/>
+          <a:lstStyle/>
+          <a:p>
+            <a:r>
+              <a:rPr lang="en-US" dirty="0"/>
+              <a:t>Step 1: Remove any application-specific implementation of entities</a:t>
+            </a:r>
+          </a:p>
+          <a:p>
+            <a:endParaRPr lang="en-US" dirty="0"/>
+          </a:p>
+          <a:p>
+            <a:r>
+              <a:rPr lang="en-US" dirty="0"/>
+              <a:t>Step 2: Hook into Spring Boot’s Flyway autoconfiguration</a:t>
+            </a:r>
+          </a:p>
+          <a:p>
+            <a:endParaRPr lang="en-US" dirty="0"/>
+          </a:p>
+          <a:p>
+            <a:r>
+              <a:rPr lang="en-US" dirty="0"/>
+              <a:t>Step 3: Create code to execute certain scripts before &amp; after the service 	    scripts are executed</a:t>
+            </a:r>
+          </a:p>
+        </p:txBody>
+      </p:sp>
+    </p:spTree>
+    <p:extLst>
+      <p:ext uri="{BB962C8B-B14F-4D97-AF65-F5344CB8AC3E}">
+        <p14:creationId xmlns:p14="http://schemas.microsoft.com/office/powerpoint/2010/main" val="2432134010"/>
+      </p:ext>
+    </p:extLst>
+  </p:cSld>
+  <p:clrMapOvr>
+    <a:masterClrMapping/>
+  </p:clrMapOvr>
+</p:sld>
+</file>
+
+<file path=ppt/slides/slide9.xml><?xml version="1.0" encoding="utf-8"?>
+<p:sld xmlns:a="http://schemas.openxmlformats.org/drawingml/2006/main" xmlns:r="http://schemas.openxmlformats.org/officeDocument/2006/relationships" xmlns:p="http://schemas.openxmlformats.org/presentationml/2006/main">
+  <p:cSld>
+    <p:spTree>
+      <p:nvGrpSpPr>
+        <p:cNvPr id="1" name=""/>
+        <p:cNvGrpSpPr/>
+        <p:nvPr/>
+      </p:nvGrpSpPr>
+      <p:grpSpPr>
+        <a:xfrm>
+          <a:off x="0" y="0"/>
+          <a:ext cx="0" cy="0"/>
+          <a:chOff x="0" y="0"/>
+          <a:chExt cx="0" cy="0"/>
+        </a:xfrm>
+      </p:grpSpPr>
+      <p:sp>
+        <p:nvSpPr>
+          <p:cNvPr id="2" name="Titel 1"/>
+          <p:cNvSpPr>
+            <a:spLocks noGrp="1"/>
+          </p:cNvSpPr>
+          <p:nvPr>
+            <p:ph type="title"/>
+          </p:nvPr>
+        </p:nvSpPr>
+        <p:spPr/>
+        <p:txBody>
+          <a:bodyPr/>
+          <a:lstStyle/>
+          <a:p>
+            <a:r>
+              <a:rPr lang="en-US" dirty="0"/>
+              <a:t>Questions</a:t>
+            </a:r>
+          </a:p>
+        </p:txBody>
+      </p:sp>
+      <p:sp>
+        <p:nvSpPr>
+          <p:cNvPr id="3" name="Tijdelijke aanduiding voor inhoud 2"/>
+          <p:cNvSpPr>
+            <a:spLocks noGrp="1"/>
+          </p:cNvSpPr>
+          <p:nvPr>
+            <p:ph idx="1"/>
+          </p:nvPr>
+        </p:nvSpPr>
+        <p:spPr/>
+        <p:txBody>
+          <a:bodyPr/>
+          <a:lstStyle/>
+          <a:p>
+            <a:endParaRPr lang="en-US"/>
+          </a:p>
+        </p:txBody>
+      </p:sp>
+    </p:spTree>
+    <p:extLst>
+      <p:ext uri="{BB962C8B-B14F-4D97-AF65-F5344CB8AC3E}">
+        <p14:creationId xmlns:p14="http://schemas.microsoft.com/office/powerpoint/2010/main" val="1751666338"/>
       </p:ext>
     </p:extLst>
   </p:cSld>

</xml_diff>

<commit_message>
Added sheets to ppt
</commit_message>
<xml_diff>
--- a/Spring boot - adapting to your environment.pptx
+++ b/Spring boot - adapting to your environment.pptx
@@ -5,20 +5,24 @@
     <p:sldMasterId id="2147483648" r:id="rId1"/>
   </p:sldMasterIdLst>
   <p:notesMasterIdLst>
-    <p:notesMasterId r:id="rId10"/>
+    <p:notesMasterId r:id="rId14"/>
   </p:notesMasterIdLst>
   <p:handoutMasterIdLst>
-    <p:handoutMasterId r:id="rId11"/>
+    <p:handoutMasterId r:id="rId15"/>
   </p:handoutMasterIdLst>
   <p:sldIdLst>
     <p:sldId id="258" r:id="rId2"/>
     <p:sldId id="269" r:id="rId3"/>
-    <p:sldId id="270" r:id="rId4"/>
-    <p:sldId id="271" r:id="rId5"/>
-    <p:sldId id="266" r:id="rId6"/>
-    <p:sldId id="267" r:id="rId7"/>
-    <p:sldId id="268" r:id="rId8"/>
-    <p:sldId id="260" r:id="rId9"/>
+    <p:sldId id="272" r:id="rId4"/>
+    <p:sldId id="273" r:id="rId5"/>
+    <p:sldId id="275" r:id="rId6"/>
+    <p:sldId id="270" r:id="rId7"/>
+    <p:sldId id="271" r:id="rId8"/>
+    <p:sldId id="266" r:id="rId9"/>
+    <p:sldId id="267" r:id="rId10"/>
+    <p:sldId id="268" r:id="rId11"/>
+    <p:sldId id="274" r:id="rId12"/>
+    <p:sldId id="260" r:id="rId13"/>
   </p:sldIdLst>
   <p:sldSz cx="9144000" cy="6858000" type="screen4x3"/>
   <p:notesSz cx="6858000" cy="9144000"/>
@@ -222,7 +226,7 @@
           <a:p>
             <a:fld id="{B6CAA392-5ACD-A84F-9824-1CE0A24F5EF1}" type="datetimeFigureOut">
               <a:rPr lang="en-US" smtClean="0"/>
-              <a:t>05/11/2017</a:t>
+              <a:t>05/15/2017</a:t>
             </a:fld>
             <a:endParaRPr lang="en-US"/>
           </a:p>
@@ -388,7 +392,7 @@
           <a:p>
             <a:fld id="{97D69B69-5611-364E-A30B-2E39388589D2}" type="datetimeFigureOut">
               <a:rPr lang="en-US" smtClean="0"/>
-              <a:t>05/11/2017</a:t>
+              <a:t>05/15/2017</a:t>
             </a:fld>
             <a:endParaRPr lang="en-US"/>
           </a:p>
@@ -2156,6 +2160,277 @@
 </p:sld>
 </file>
 
+<file path=ppt/slides/slide10.xml><?xml version="1.0" encoding="utf-8"?>
+<p:sld xmlns:a="http://schemas.openxmlformats.org/drawingml/2006/main" xmlns:r="http://schemas.openxmlformats.org/officeDocument/2006/relationships" xmlns:p="http://schemas.openxmlformats.org/presentationml/2006/main">
+  <p:cSld>
+    <p:spTree>
+      <p:nvGrpSpPr>
+        <p:cNvPr id="1" name=""/>
+        <p:cNvGrpSpPr/>
+        <p:nvPr/>
+      </p:nvGrpSpPr>
+      <p:grpSpPr>
+        <a:xfrm>
+          <a:off x="0" y="0"/>
+          <a:ext cx="0" cy="0"/>
+          <a:chOff x="0" y="0"/>
+          <a:chExt cx="0" cy="0"/>
+        </a:xfrm>
+      </p:grpSpPr>
+      <p:sp>
+        <p:nvSpPr>
+          <p:cNvPr id="2" name="Titel 1"/>
+          <p:cNvSpPr>
+            <a:spLocks noGrp="1"/>
+          </p:cNvSpPr>
+          <p:nvPr>
+            <p:ph type="title"/>
+          </p:nvPr>
+        </p:nvSpPr>
+        <p:spPr/>
+        <p:txBody>
+          <a:bodyPr/>
+          <a:lstStyle/>
+          <a:p>
+            <a:r>
+              <a:rPr lang="en-US" dirty="0"/>
+              <a:t>LAB 2: Centralize entities</a:t>
+            </a:r>
+          </a:p>
+        </p:txBody>
+      </p:sp>
+      <p:sp>
+        <p:nvSpPr>
+          <p:cNvPr id="3" name="Tijdelijke aanduiding voor inhoud 2"/>
+          <p:cNvSpPr>
+            <a:spLocks noGrp="1"/>
+          </p:cNvSpPr>
+          <p:nvPr>
+            <p:ph idx="1"/>
+          </p:nvPr>
+        </p:nvSpPr>
+        <p:spPr/>
+        <p:txBody>
+          <a:bodyPr>
+            <a:normAutofit lnSpcReduction="10000"/>
+          </a:bodyPr>
+          <a:lstStyle/>
+          <a:p>
+            <a:r>
+              <a:rPr lang="en-US" dirty="0"/>
+              <a:t>Step 1: Remove any application-specific implementation of entities</a:t>
+            </a:r>
+          </a:p>
+          <a:p>
+            <a:endParaRPr lang="en-US" dirty="0"/>
+          </a:p>
+          <a:p>
+            <a:r>
+              <a:rPr lang="en-US" dirty="0"/>
+              <a:t>Step 2: Hook into Spring Boot’s Flyway autoconfiguration</a:t>
+            </a:r>
+          </a:p>
+          <a:p>
+            <a:endParaRPr lang="en-US" dirty="0"/>
+          </a:p>
+          <a:p>
+            <a:r>
+              <a:rPr lang="en-US" dirty="0"/>
+              <a:t>Step 3: Create code to execute certain scripts before &amp; after the service scripts are executed</a:t>
+            </a:r>
+          </a:p>
+        </p:txBody>
+      </p:sp>
+    </p:spTree>
+    <p:extLst>
+      <p:ext uri="{BB962C8B-B14F-4D97-AF65-F5344CB8AC3E}">
+        <p14:creationId xmlns:p14="http://schemas.microsoft.com/office/powerpoint/2010/main" val="2432134010"/>
+      </p:ext>
+    </p:extLst>
+  </p:cSld>
+  <p:clrMapOvr>
+    <a:masterClrMapping/>
+  </p:clrMapOvr>
+</p:sld>
+</file>
+
+<file path=ppt/slides/slide11.xml><?xml version="1.0" encoding="utf-8"?>
+<p:sld xmlns:a="http://schemas.openxmlformats.org/drawingml/2006/main" xmlns:r="http://schemas.openxmlformats.org/officeDocument/2006/relationships" xmlns:p="http://schemas.openxmlformats.org/presentationml/2006/main">
+  <p:cSld>
+    <p:spTree>
+      <p:nvGrpSpPr>
+        <p:cNvPr id="1" name=""/>
+        <p:cNvGrpSpPr/>
+        <p:nvPr/>
+      </p:nvGrpSpPr>
+      <p:grpSpPr>
+        <a:xfrm>
+          <a:off x="0" y="0"/>
+          <a:ext cx="0" cy="0"/>
+          <a:chOff x="0" y="0"/>
+          <a:chExt cx="0" cy="0"/>
+        </a:xfrm>
+      </p:grpSpPr>
+      <p:sp>
+        <p:nvSpPr>
+          <p:cNvPr id="2" name="Titel 1"/>
+          <p:cNvSpPr>
+            <a:spLocks noGrp="1"/>
+          </p:cNvSpPr>
+          <p:nvPr>
+            <p:ph type="title"/>
+          </p:nvPr>
+        </p:nvSpPr>
+        <p:spPr/>
+        <p:txBody>
+          <a:bodyPr>
+            <a:normAutofit fontScale="90000"/>
+          </a:bodyPr>
+          <a:lstStyle/>
+          <a:p>
+            <a:r>
+              <a:rPr lang="en-US" dirty="0"/>
+              <a:t>LAB 3: centralize </a:t>
+            </a:r>
+            <a:r>
+              <a:rPr lang="en-US" dirty="0" err="1"/>
+              <a:t>messagehandling</a:t>
+            </a:r>
+            <a:r>
+              <a:rPr lang="en-US" dirty="0"/>
+              <a:t> (optional)</a:t>
+            </a:r>
+          </a:p>
+        </p:txBody>
+      </p:sp>
+      <p:sp>
+        <p:nvSpPr>
+          <p:cNvPr id="3" name="Tijdelijke aanduiding voor inhoud 2"/>
+          <p:cNvSpPr>
+            <a:spLocks noGrp="1"/>
+          </p:cNvSpPr>
+          <p:nvPr>
+            <p:ph idx="1"/>
+          </p:nvPr>
+        </p:nvSpPr>
+        <p:spPr/>
+        <p:txBody>
+          <a:bodyPr>
+            <a:normAutofit/>
+          </a:bodyPr>
+          <a:lstStyle/>
+          <a:p>
+            <a:r>
+              <a:rPr lang="en-US" dirty="0"/>
+              <a:t>Step 1: Remove any application-specific implementation of JMS </a:t>
+            </a:r>
+            <a:r>
+              <a:rPr lang="en-US" dirty="0" err="1"/>
+              <a:t>messagelisteners</a:t>
+            </a:r>
+            <a:endParaRPr lang="en-US" dirty="0"/>
+          </a:p>
+          <a:p>
+            <a:endParaRPr lang="en-US" dirty="0"/>
+          </a:p>
+          <a:p>
+            <a:r>
+              <a:rPr lang="en-US" dirty="0"/>
+              <a:t>Step 2: Add the @</a:t>
+            </a:r>
+            <a:r>
+              <a:rPr lang="en-US" dirty="0" err="1"/>
+              <a:t>MessageHandlerBean</a:t>
+            </a:r>
+            <a:r>
+              <a:rPr lang="en-US" dirty="0"/>
+              <a:t> </a:t>
+            </a:r>
+            <a:r>
+              <a:rPr lang="en-US" dirty="0" err="1"/>
+              <a:t>annotion</a:t>
+            </a:r>
+            <a:r>
+              <a:rPr lang="en-US" dirty="0"/>
+              <a:t> to the </a:t>
+            </a:r>
+            <a:r>
+              <a:rPr lang="en-US" dirty="0" err="1"/>
+              <a:t>messagehandler</a:t>
+            </a:r>
+            <a:endParaRPr lang="en-US" dirty="0"/>
+          </a:p>
+        </p:txBody>
+      </p:sp>
+    </p:spTree>
+    <p:extLst>
+      <p:ext uri="{BB962C8B-B14F-4D97-AF65-F5344CB8AC3E}">
+        <p14:creationId xmlns:p14="http://schemas.microsoft.com/office/powerpoint/2010/main" val="1586196212"/>
+      </p:ext>
+    </p:extLst>
+  </p:cSld>
+  <p:clrMapOvr>
+    <a:masterClrMapping/>
+  </p:clrMapOvr>
+</p:sld>
+</file>
+
+<file path=ppt/slides/slide12.xml><?xml version="1.0" encoding="utf-8"?>
+<p:sld xmlns:a="http://schemas.openxmlformats.org/drawingml/2006/main" xmlns:r="http://schemas.openxmlformats.org/officeDocument/2006/relationships" xmlns:p="http://schemas.openxmlformats.org/presentationml/2006/main">
+  <p:cSld>
+    <p:spTree>
+      <p:nvGrpSpPr>
+        <p:cNvPr id="1" name=""/>
+        <p:cNvGrpSpPr/>
+        <p:nvPr/>
+      </p:nvGrpSpPr>
+      <p:grpSpPr>
+        <a:xfrm>
+          <a:off x="0" y="0"/>
+          <a:ext cx="0" cy="0"/>
+          <a:chOff x="0" y="0"/>
+          <a:chExt cx="0" cy="0"/>
+        </a:xfrm>
+      </p:grpSpPr>
+      <p:sp>
+        <p:nvSpPr>
+          <p:cNvPr id="2" name="Title 1"/>
+          <p:cNvSpPr>
+            <a:spLocks noGrp="1"/>
+          </p:cNvSpPr>
+          <p:nvPr>
+            <p:ph type="title"/>
+          </p:nvPr>
+        </p:nvSpPr>
+        <p:spPr/>
+        <p:txBody>
+          <a:bodyPr/>
+          <a:lstStyle/>
+          <a:p>
+            <a:r>
+              <a:rPr lang="en-US" dirty="0">
+                <a:solidFill>
+                  <a:srgbClr val="D0AE55"/>
+                </a:solidFill>
+              </a:rPr>
+              <a:t>Q&amp;A</a:t>
+            </a:r>
+          </a:p>
+        </p:txBody>
+      </p:sp>
+    </p:spTree>
+    <p:extLst>
+      <p:ext uri="{BB962C8B-B14F-4D97-AF65-F5344CB8AC3E}">
+        <p14:creationId xmlns:p14="http://schemas.microsoft.com/office/powerpoint/2010/main" val="1729372591"/>
+      </p:ext>
+    </p:extLst>
+  </p:cSld>
+  <p:clrMapOvr>
+    <a:masterClrMapping/>
+  </p:clrMapOvr>
+</p:sld>
+</file>
+
 <file path=ppt/slides/slide2.xml><?xml version="1.0" encoding="utf-8"?>
 <p:sld xmlns:a="http://schemas.openxmlformats.org/drawingml/2006/main" xmlns:r="http://schemas.openxmlformats.org/officeDocument/2006/relationships" xmlns:p="http://schemas.openxmlformats.org/presentationml/2006/main">
   <p:cSld>
@@ -2383,6 +2658,321 @@
 </file>
 
 <file path=ppt/slides/slide3.xml><?xml version="1.0" encoding="utf-8"?>
+<p:sld xmlns:a="http://schemas.openxmlformats.org/drawingml/2006/main" xmlns:r="http://schemas.openxmlformats.org/officeDocument/2006/relationships" xmlns:p="http://schemas.openxmlformats.org/presentationml/2006/main">
+  <p:cSld>
+    <p:spTree>
+      <p:nvGrpSpPr>
+        <p:cNvPr id="1" name=""/>
+        <p:cNvGrpSpPr/>
+        <p:nvPr/>
+      </p:nvGrpSpPr>
+      <p:grpSpPr>
+        <a:xfrm>
+          <a:off x="0" y="0"/>
+          <a:ext cx="0" cy="0"/>
+          <a:chOff x="0" y="0"/>
+          <a:chExt cx="0" cy="0"/>
+        </a:xfrm>
+      </p:grpSpPr>
+      <p:sp>
+        <p:nvSpPr>
+          <p:cNvPr id="2" name="Titel 1"/>
+          <p:cNvSpPr>
+            <a:spLocks noGrp="1"/>
+          </p:cNvSpPr>
+          <p:nvPr>
+            <p:ph type="title"/>
+          </p:nvPr>
+        </p:nvSpPr>
+        <p:spPr/>
+        <p:txBody>
+          <a:bodyPr/>
+          <a:lstStyle/>
+          <a:p>
+            <a:r>
+              <a:rPr lang="en-US" dirty="0"/>
+              <a:t>Agenda</a:t>
+            </a:r>
+          </a:p>
+        </p:txBody>
+      </p:sp>
+      <p:sp>
+        <p:nvSpPr>
+          <p:cNvPr id="3" name="Tijdelijke aanduiding voor inhoud 2"/>
+          <p:cNvSpPr>
+            <a:spLocks noGrp="1"/>
+          </p:cNvSpPr>
+          <p:nvPr>
+            <p:ph idx="1"/>
+          </p:nvPr>
+        </p:nvSpPr>
+        <p:spPr/>
+        <p:txBody>
+          <a:bodyPr>
+            <a:normAutofit lnSpcReduction="10000"/>
+          </a:bodyPr>
+          <a:lstStyle/>
+          <a:p>
+            <a:r>
+              <a:rPr lang="en-US" dirty="0"/>
+              <a:t>Spring Boot</a:t>
+            </a:r>
+          </a:p>
+          <a:p>
+            <a:r>
+              <a:rPr lang="en-US" dirty="0"/>
+              <a:t>We want more!</a:t>
+            </a:r>
+          </a:p>
+          <a:p>
+            <a:endParaRPr lang="en-US" dirty="0"/>
+          </a:p>
+          <a:p>
+            <a:r>
+              <a:rPr lang="en-US" dirty="0"/>
+              <a:t>Lab1</a:t>
+            </a:r>
+          </a:p>
+          <a:p>
+            <a:r>
+              <a:rPr lang="en-US" dirty="0"/>
+              <a:t>Lab2</a:t>
+            </a:r>
+          </a:p>
+          <a:p>
+            <a:r>
+              <a:rPr lang="en-US" dirty="0"/>
+              <a:t>(Lab3)</a:t>
+            </a:r>
+          </a:p>
+          <a:p>
+            <a:endParaRPr lang="en-US" dirty="0"/>
+          </a:p>
+          <a:p>
+            <a:r>
+              <a:rPr lang="en-US" dirty="0"/>
+              <a:t>Wrap up</a:t>
+            </a:r>
+          </a:p>
+        </p:txBody>
+      </p:sp>
+    </p:spTree>
+    <p:extLst>
+      <p:ext uri="{BB962C8B-B14F-4D97-AF65-F5344CB8AC3E}">
+        <p14:creationId xmlns:p14="http://schemas.microsoft.com/office/powerpoint/2010/main" val="3297451616"/>
+      </p:ext>
+    </p:extLst>
+  </p:cSld>
+  <p:clrMapOvr>
+    <a:masterClrMapping/>
+  </p:clrMapOvr>
+</p:sld>
+</file>
+
+<file path=ppt/slides/slide4.xml><?xml version="1.0" encoding="utf-8"?>
+<p:sld xmlns:a="http://schemas.openxmlformats.org/drawingml/2006/main" xmlns:r="http://schemas.openxmlformats.org/officeDocument/2006/relationships" xmlns:p="http://schemas.openxmlformats.org/presentationml/2006/main">
+  <p:cSld>
+    <p:spTree>
+      <p:nvGrpSpPr>
+        <p:cNvPr id="1" name=""/>
+        <p:cNvGrpSpPr/>
+        <p:nvPr/>
+      </p:nvGrpSpPr>
+      <p:grpSpPr>
+        <a:xfrm>
+          <a:off x="0" y="0"/>
+          <a:ext cx="0" cy="0"/>
+          <a:chOff x="0" y="0"/>
+          <a:chExt cx="0" cy="0"/>
+        </a:xfrm>
+      </p:grpSpPr>
+      <p:sp>
+        <p:nvSpPr>
+          <p:cNvPr id="2" name="Titel 1"/>
+          <p:cNvSpPr>
+            <a:spLocks noGrp="1"/>
+          </p:cNvSpPr>
+          <p:nvPr>
+            <p:ph type="title"/>
+          </p:nvPr>
+        </p:nvSpPr>
+        <p:spPr/>
+        <p:txBody>
+          <a:bodyPr/>
+          <a:lstStyle/>
+          <a:p>
+            <a:r>
+              <a:rPr lang="en-US" dirty="0"/>
+              <a:t>Spring Boot</a:t>
+            </a:r>
+          </a:p>
+        </p:txBody>
+      </p:sp>
+      <p:sp>
+        <p:nvSpPr>
+          <p:cNvPr id="3" name="Tijdelijke aanduiding voor inhoud 2"/>
+          <p:cNvSpPr>
+            <a:spLocks noGrp="1"/>
+          </p:cNvSpPr>
+          <p:nvPr>
+            <p:ph idx="1"/>
+          </p:nvPr>
+        </p:nvSpPr>
+        <p:spPr/>
+        <p:txBody>
+          <a:bodyPr>
+            <a:normAutofit fontScale="85000" lnSpcReduction="20000"/>
+          </a:bodyPr>
+          <a:lstStyle/>
+          <a:p>
+            <a:r>
+              <a:rPr lang="en-US" dirty="0"/>
+              <a:t>Provide a radically faster and widely accessible getting started experience for all Spring development.</a:t>
+            </a:r>
+          </a:p>
+          <a:p>
+            <a:r>
+              <a:rPr lang="en-US" dirty="0"/>
+              <a:t>Be opinionated out of the box, but get out of the way quickly as requirements start to diverge from the defaults.</a:t>
+            </a:r>
+          </a:p>
+          <a:p>
+            <a:r>
+              <a:rPr lang="en-US" dirty="0"/>
+              <a:t>Provide a range of non-functional features that are common to large classes of projects (e.g. embedded servers, security, metrics, health checks, externalized configuration).</a:t>
+            </a:r>
+          </a:p>
+          <a:p>
+            <a:r>
+              <a:rPr lang="en-US" dirty="0"/>
+              <a:t>Absolutely no code generation and no requirement for XML configuration.</a:t>
+            </a:r>
+          </a:p>
+          <a:p>
+            <a:endParaRPr lang="en-US" dirty="0"/>
+          </a:p>
+        </p:txBody>
+      </p:sp>
+    </p:spTree>
+    <p:extLst>
+      <p:ext uri="{BB962C8B-B14F-4D97-AF65-F5344CB8AC3E}">
+        <p14:creationId xmlns:p14="http://schemas.microsoft.com/office/powerpoint/2010/main" val="3043236105"/>
+      </p:ext>
+    </p:extLst>
+  </p:cSld>
+  <p:clrMapOvr>
+    <a:masterClrMapping/>
+  </p:clrMapOvr>
+</p:sld>
+</file>
+
+<file path=ppt/slides/slide5.xml><?xml version="1.0" encoding="utf-8"?>
+<p:sld xmlns:a="http://schemas.openxmlformats.org/drawingml/2006/main" xmlns:r="http://schemas.openxmlformats.org/officeDocument/2006/relationships" xmlns:p="http://schemas.openxmlformats.org/presentationml/2006/main">
+  <p:cSld>
+    <p:spTree>
+      <p:nvGrpSpPr>
+        <p:cNvPr id="1" name=""/>
+        <p:cNvGrpSpPr/>
+        <p:nvPr/>
+      </p:nvGrpSpPr>
+      <p:grpSpPr>
+        <a:xfrm>
+          <a:off x="0" y="0"/>
+          <a:ext cx="0" cy="0"/>
+          <a:chOff x="0" y="0"/>
+          <a:chExt cx="0" cy="0"/>
+        </a:xfrm>
+      </p:grpSpPr>
+      <p:sp>
+        <p:nvSpPr>
+          <p:cNvPr id="2" name="Titel 1"/>
+          <p:cNvSpPr>
+            <a:spLocks noGrp="1"/>
+          </p:cNvSpPr>
+          <p:nvPr>
+            <p:ph type="title"/>
+          </p:nvPr>
+        </p:nvSpPr>
+        <p:spPr/>
+        <p:txBody>
+          <a:bodyPr/>
+          <a:lstStyle/>
+          <a:p>
+            <a:r>
+              <a:rPr lang="en-US" dirty="0"/>
+              <a:t>We want more!</a:t>
+            </a:r>
+          </a:p>
+        </p:txBody>
+      </p:sp>
+      <p:sp>
+        <p:nvSpPr>
+          <p:cNvPr id="3" name="Tijdelijke aanduiding voor inhoud 2"/>
+          <p:cNvSpPr>
+            <a:spLocks noGrp="1"/>
+          </p:cNvSpPr>
+          <p:nvPr>
+            <p:ph idx="1"/>
+          </p:nvPr>
+        </p:nvSpPr>
+        <p:spPr/>
+        <p:txBody>
+          <a:bodyPr/>
+          <a:lstStyle/>
+          <a:p>
+            <a:pPr marL="0" indent="0">
+              <a:buNone/>
+            </a:pPr>
+            <a:r>
+              <a:rPr lang="en-US" dirty="0"/>
+              <a:t>Imagine your company:</a:t>
+            </a:r>
+          </a:p>
+          <a:p>
+            <a:r>
+              <a:rPr lang="en-US" dirty="0"/>
+              <a:t>has a different opinion</a:t>
+            </a:r>
+          </a:p>
+          <a:p>
+            <a:r>
+              <a:rPr lang="en-US" dirty="0"/>
+              <a:t>builds software on a uniform stack</a:t>
+            </a:r>
+          </a:p>
+          <a:p>
+            <a:r>
+              <a:rPr lang="en-US" dirty="0"/>
+              <a:t>has a lot of applications to maintain</a:t>
+            </a:r>
+          </a:p>
+          <a:p>
+            <a:r>
+              <a:rPr lang="en-US" dirty="0"/>
+              <a:t>has custom requirements across </a:t>
+            </a:r>
+            <a:r>
+              <a:rPr lang="en-US"/>
+              <a:t>all applications</a:t>
+            </a:r>
+            <a:endParaRPr lang="en-US" dirty="0"/>
+          </a:p>
+        </p:txBody>
+      </p:sp>
+    </p:spTree>
+    <p:extLst>
+      <p:ext uri="{BB962C8B-B14F-4D97-AF65-F5344CB8AC3E}">
+        <p14:creationId xmlns:p14="http://schemas.microsoft.com/office/powerpoint/2010/main" val="3035099329"/>
+      </p:ext>
+    </p:extLst>
+  </p:cSld>
+  <p:clrMapOvr>
+    <a:masterClrMapping/>
+  </p:clrMapOvr>
+</p:sld>
+</file>
+
+<file path=ppt/slides/slide6.xml><?xml version="1.0" encoding="utf-8"?>
 <p:sld xmlns:a="http://schemas.openxmlformats.org/drawingml/2006/main" xmlns:r="http://schemas.openxmlformats.org/officeDocument/2006/relationships" xmlns:p="http://schemas.openxmlformats.org/presentationml/2006/main">
   <p:cSld>
     <p:spTree>
@@ -2874,7 +3464,7 @@
 </p:sld>
 </file>
 
-<file path=ppt/slides/slide4.xml><?xml version="1.0" encoding="utf-8"?>
+<file path=ppt/slides/slide7.xml><?xml version="1.0" encoding="utf-8"?>
 <p:sld xmlns:a="http://schemas.openxmlformats.org/drawingml/2006/main" xmlns:r="http://schemas.openxmlformats.org/officeDocument/2006/relationships" xmlns:p="http://schemas.openxmlformats.org/presentationml/2006/main">
   <p:cSld>
     <p:spTree>
@@ -3533,7 +4123,7 @@
 </p:sld>
 </file>
 
-<file path=ppt/slides/slide5.xml><?xml version="1.0" encoding="utf-8"?>
+<file path=ppt/slides/slide8.xml><?xml version="1.0" encoding="utf-8"?>
 <p:sld xmlns:a="http://schemas.openxmlformats.org/drawingml/2006/main" xmlns:r="http://schemas.openxmlformats.org/officeDocument/2006/relationships" xmlns:p="http://schemas.openxmlformats.org/presentationml/2006/main">
   <p:cSld>
     <p:spTree>
@@ -3633,7 +4223,7 @@
 </p:sld>
 </file>
 
-<file path=ppt/slides/slide6.xml><?xml version="1.0" encoding="utf-8"?>
+<file path=ppt/slides/slide9.xml><?xml version="1.0" encoding="utf-8"?>
 <p:sld xmlns:a="http://schemas.openxmlformats.org/drawingml/2006/main" xmlns:r="http://schemas.openxmlformats.org/officeDocument/2006/relationships" xmlns:p="http://schemas.openxmlformats.org/presentationml/2006/main">
   <p:cSld>
     <p:spTree>
@@ -3707,156 +4297,6 @@
     <p:extLst>
       <p:ext uri="{BB962C8B-B14F-4D97-AF65-F5344CB8AC3E}">
         <p14:creationId xmlns:p14="http://schemas.microsoft.com/office/powerpoint/2010/main" val="2910224620"/>
-      </p:ext>
-    </p:extLst>
-  </p:cSld>
-  <p:clrMapOvr>
-    <a:masterClrMapping/>
-  </p:clrMapOvr>
-</p:sld>
-</file>
-
-<file path=ppt/slides/slide7.xml><?xml version="1.0" encoding="utf-8"?>
-<p:sld xmlns:a="http://schemas.openxmlformats.org/drawingml/2006/main" xmlns:r="http://schemas.openxmlformats.org/officeDocument/2006/relationships" xmlns:p="http://schemas.openxmlformats.org/presentationml/2006/main">
-  <p:cSld>
-    <p:spTree>
-      <p:nvGrpSpPr>
-        <p:cNvPr id="1" name=""/>
-        <p:cNvGrpSpPr/>
-        <p:nvPr/>
-      </p:nvGrpSpPr>
-      <p:grpSpPr>
-        <a:xfrm>
-          <a:off x="0" y="0"/>
-          <a:ext cx="0" cy="0"/>
-          <a:chOff x="0" y="0"/>
-          <a:chExt cx="0" cy="0"/>
-        </a:xfrm>
-      </p:grpSpPr>
-      <p:sp>
-        <p:nvSpPr>
-          <p:cNvPr id="2" name="Titel 1"/>
-          <p:cNvSpPr>
-            <a:spLocks noGrp="1"/>
-          </p:cNvSpPr>
-          <p:nvPr>
-            <p:ph type="title"/>
-          </p:nvPr>
-        </p:nvSpPr>
-        <p:spPr/>
-        <p:txBody>
-          <a:bodyPr/>
-          <a:lstStyle/>
-          <a:p>
-            <a:r>
-              <a:rPr lang="en-US" dirty="0"/>
-              <a:t>LAB 2: Centralize entities</a:t>
-            </a:r>
-          </a:p>
-        </p:txBody>
-      </p:sp>
-      <p:sp>
-        <p:nvSpPr>
-          <p:cNvPr id="3" name="Tijdelijke aanduiding voor inhoud 2"/>
-          <p:cNvSpPr>
-            <a:spLocks noGrp="1"/>
-          </p:cNvSpPr>
-          <p:nvPr>
-            <p:ph idx="1"/>
-          </p:nvPr>
-        </p:nvSpPr>
-        <p:spPr/>
-        <p:txBody>
-          <a:bodyPr>
-            <a:normAutofit lnSpcReduction="10000"/>
-          </a:bodyPr>
-          <a:lstStyle/>
-          <a:p>
-            <a:r>
-              <a:rPr lang="en-US" dirty="0"/>
-              <a:t>Step 1: Remove any application-specific implementation of entities</a:t>
-            </a:r>
-          </a:p>
-          <a:p>
-            <a:endParaRPr lang="en-US" dirty="0"/>
-          </a:p>
-          <a:p>
-            <a:r>
-              <a:rPr lang="en-US" dirty="0"/>
-              <a:t>Step 2: Hook into Spring Boot’s Flyway autoconfiguration</a:t>
-            </a:r>
-          </a:p>
-          <a:p>
-            <a:endParaRPr lang="en-US" dirty="0"/>
-          </a:p>
-          <a:p>
-            <a:r>
-              <a:rPr lang="en-US" dirty="0"/>
-              <a:t>Step 3: Create code to execute certain scripts before &amp; after the service scripts are executed</a:t>
-            </a:r>
-          </a:p>
-        </p:txBody>
-      </p:sp>
-    </p:spTree>
-    <p:extLst>
-      <p:ext uri="{BB962C8B-B14F-4D97-AF65-F5344CB8AC3E}">
-        <p14:creationId xmlns:p14="http://schemas.microsoft.com/office/powerpoint/2010/main" val="2432134010"/>
-      </p:ext>
-    </p:extLst>
-  </p:cSld>
-  <p:clrMapOvr>
-    <a:masterClrMapping/>
-  </p:clrMapOvr>
-</p:sld>
-</file>
-
-<file path=ppt/slides/slide8.xml><?xml version="1.0" encoding="utf-8"?>
-<p:sld xmlns:a="http://schemas.openxmlformats.org/drawingml/2006/main" xmlns:r="http://schemas.openxmlformats.org/officeDocument/2006/relationships" xmlns:p="http://schemas.openxmlformats.org/presentationml/2006/main">
-  <p:cSld>
-    <p:spTree>
-      <p:nvGrpSpPr>
-        <p:cNvPr id="1" name=""/>
-        <p:cNvGrpSpPr/>
-        <p:nvPr/>
-      </p:nvGrpSpPr>
-      <p:grpSpPr>
-        <a:xfrm>
-          <a:off x="0" y="0"/>
-          <a:ext cx="0" cy="0"/>
-          <a:chOff x="0" y="0"/>
-          <a:chExt cx="0" cy="0"/>
-        </a:xfrm>
-      </p:grpSpPr>
-      <p:sp>
-        <p:nvSpPr>
-          <p:cNvPr id="2" name="Title 1"/>
-          <p:cNvSpPr>
-            <a:spLocks noGrp="1"/>
-          </p:cNvSpPr>
-          <p:nvPr>
-            <p:ph type="title"/>
-          </p:nvPr>
-        </p:nvSpPr>
-        <p:spPr/>
-        <p:txBody>
-          <a:bodyPr/>
-          <a:lstStyle/>
-          <a:p>
-            <a:r>
-              <a:rPr lang="en-US" dirty="0">
-                <a:solidFill>
-                  <a:srgbClr val="D0AE55"/>
-                </a:solidFill>
-              </a:rPr>
-              <a:t>Q&amp;A</a:t>
-            </a:r>
-          </a:p>
-        </p:txBody>
-      </p:sp>
-    </p:spTree>
-    <p:extLst>
-      <p:ext uri="{BB962C8B-B14F-4D97-AF65-F5344CB8AC3E}">
-        <p14:creationId xmlns:p14="http://schemas.microsoft.com/office/powerpoint/2010/main" val="1729372591"/>
       </p:ext>
     </p:extLst>
   </p:cSld>

</xml_diff>

<commit_message>
Added sheet with content of workshop
</commit_message>
<xml_diff>
--- a/Spring boot - adapting to your environment.pptx
+++ b/Spring boot - adapting to your environment.pptx
@@ -5,10 +5,10 @@
     <p:sldMasterId id="2147483648" r:id="rId1"/>
   </p:sldMasterIdLst>
   <p:notesMasterIdLst>
-    <p:notesMasterId r:id="rId14"/>
+    <p:notesMasterId r:id="rId15"/>
   </p:notesMasterIdLst>
   <p:handoutMasterIdLst>
-    <p:handoutMasterId r:id="rId15"/>
+    <p:handoutMasterId r:id="rId16"/>
   </p:handoutMasterIdLst>
   <p:sldIdLst>
     <p:sldId id="258" r:id="rId2"/>
@@ -16,13 +16,14 @@
     <p:sldId id="272" r:id="rId4"/>
     <p:sldId id="273" r:id="rId5"/>
     <p:sldId id="275" r:id="rId6"/>
-    <p:sldId id="270" r:id="rId7"/>
-    <p:sldId id="271" r:id="rId8"/>
-    <p:sldId id="266" r:id="rId9"/>
-    <p:sldId id="267" r:id="rId10"/>
-    <p:sldId id="268" r:id="rId11"/>
-    <p:sldId id="274" r:id="rId12"/>
-    <p:sldId id="260" r:id="rId13"/>
+    <p:sldId id="276" r:id="rId7"/>
+    <p:sldId id="270" r:id="rId8"/>
+    <p:sldId id="271" r:id="rId9"/>
+    <p:sldId id="266" r:id="rId10"/>
+    <p:sldId id="267" r:id="rId11"/>
+    <p:sldId id="268" r:id="rId12"/>
+    <p:sldId id="274" r:id="rId13"/>
+    <p:sldId id="260" r:id="rId14"/>
   </p:sldIdLst>
   <p:sldSz cx="9144000" cy="6858000" type="screen4x3"/>
   <p:notesSz cx="6858000" cy="9144000"/>
@@ -123,7 +124,7 @@
   </p:defaultTextStyle>
   <p:extLst>
     <p:ext uri="{EFAFB233-063F-42B5-8137-9DF3F51BA10A}">
-      <p15:sldGuideLst xmlns:p15="http://schemas.microsoft.com/office/powerpoint/2012/main">
+      <p15:sldGuideLst xmlns:p15="http://schemas.microsoft.com/office/powerpoint/2012/main" xmlns="">
         <p15:guide id="1" orient="horz" pos="2160">
           <p15:clr>
             <a:srgbClr val="A4A3A4"/>
@@ -226,7 +227,7 @@
           <a:p>
             <a:fld id="{B6CAA392-5ACD-A84F-9824-1CE0A24F5EF1}" type="datetimeFigureOut">
               <a:rPr lang="en-US" smtClean="0"/>
-              <a:t>05/15/2017</a:t>
+              <a:t>5/16/2017</a:t>
             </a:fld>
             <a:endParaRPr lang="en-US"/>
           </a:p>
@@ -392,7 +393,7 @@
           <a:p>
             <a:fld id="{97D69B69-5611-364E-A30B-2E39388589D2}" type="datetimeFigureOut">
               <a:rPr lang="en-US" smtClean="0"/>
-              <a:t>05/15/2017</a:t>
+              <a:t>5/16/2017</a:t>
             </a:fld>
             <a:endParaRPr lang="en-US"/>
           </a:p>
@@ -1043,7 +1044,7 @@
         </p:spPr>
         <p:txBody>
           <a:bodyPr vert="horz" lIns="91440" tIns="45720" rIns="91440" bIns="45720" rtlCol="0">
-            <a:normAutofit/>
+            <a:normAutofit fontScale="92500"/>
           </a:bodyPr>
           <a:lstStyle>
             <a:lvl1pPr marL="342900" indent="-342900" algn="l" defTabSz="457200" rtl="0" eaLnBrk="1" latinLnBrk="0" hangingPunct="1">
@@ -1342,7 +1343,7 @@
         </p:spPr>
         <p:txBody>
           <a:bodyPr vert="horz" lIns="91440" tIns="45720" rIns="91440" bIns="45720" rtlCol="0">
-            <a:normAutofit/>
+            <a:normAutofit fontScale="92500"/>
           </a:bodyPr>
           <a:lstStyle>
             <a:lvl1pPr marL="342900" indent="-342900" algn="l" defTabSz="457200" rtl="0" eaLnBrk="1" latinLnBrk="0" hangingPunct="1">
@@ -2080,7 +2081,7 @@
         </p:spPr>
         <p:txBody>
           <a:bodyPr>
-            <a:normAutofit fontScale="85000" lnSpcReduction="10000"/>
+            <a:normAutofit fontScale="92500" lnSpcReduction="20000"/>
           </a:bodyPr>
           <a:lstStyle>
             <a:lvl1pPr marL="0" indent="0" algn="ctr">
@@ -2194,7 +2195,7 @@
           <a:p>
             <a:r>
               <a:rPr lang="en-US" dirty="0"/>
-              <a:t>LAB 2: Centralize entities</a:t>
+              <a:t>Lab 1: centralize stack</a:t>
             </a:r>
           </a:p>
         </p:txBody>
@@ -2211,14 +2212,12 @@
         </p:nvSpPr>
         <p:spPr/>
         <p:txBody>
-          <a:bodyPr>
-            <a:normAutofit lnSpcReduction="10000"/>
-          </a:bodyPr>
+          <a:bodyPr/>
           <a:lstStyle/>
           <a:p>
             <a:r>
               <a:rPr lang="en-US" dirty="0"/>
-              <a:t>Step 1: Remove any application-specific implementation of entities</a:t>
+              <a:t>Step 1: Make the framework build on the Spring Boot stack (adding to dependency management where necessary)</a:t>
             </a:r>
           </a:p>
           <a:p>
@@ -2227,16 +2226,7 @@
           <a:p>
             <a:r>
               <a:rPr lang="en-US" dirty="0"/>
-              <a:t>Step 2: Hook into Spring Boot’s Flyway autoconfiguration</a:t>
-            </a:r>
-          </a:p>
-          <a:p>
-            <a:endParaRPr lang="en-US" dirty="0"/>
-          </a:p>
-          <a:p>
-            <a:r>
-              <a:rPr lang="en-US" dirty="0"/>
-              <a:t>Step 3: Create code to execute certain scripts before &amp; after the service scripts are executed</a:t>
+              <a:t>Step 2: Create common starters to decouple from Spring Boot’s defaults</a:t>
             </a:r>
           </a:p>
         </p:txBody>
@@ -2244,7 +2234,7 @@
     </p:spTree>
     <p:extLst>
       <p:ext uri="{BB962C8B-B14F-4D97-AF65-F5344CB8AC3E}">
-        <p14:creationId xmlns:p14="http://schemas.microsoft.com/office/powerpoint/2010/main" val="2432134010"/>
+        <p14:creationId xmlns:p14="http://schemas.microsoft.com/office/powerpoint/2010/main" val="2910224620"/>
       </p:ext>
     </p:extLst>
   </p:cSld>
@@ -2283,6 +2273,100 @@
         </p:nvSpPr>
         <p:spPr/>
         <p:txBody>
+          <a:bodyPr/>
+          <a:lstStyle/>
+          <a:p>
+            <a:r>
+              <a:rPr lang="en-US" dirty="0"/>
+              <a:t>LAB 2: Centralize entities</a:t>
+            </a:r>
+          </a:p>
+        </p:txBody>
+      </p:sp>
+      <p:sp>
+        <p:nvSpPr>
+          <p:cNvPr id="3" name="Tijdelijke aanduiding voor inhoud 2"/>
+          <p:cNvSpPr>
+            <a:spLocks noGrp="1"/>
+          </p:cNvSpPr>
+          <p:nvPr>
+            <p:ph idx="1"/>
+          </p:nvPr>
+        </p:nvSpPr>
+        <p:spPr/>
+        <p:txBody>
+          <a:bodyPr>
+            <a:normAutofit lnSpcReduction="10000"/>
+          </a:bodyPr>
+          <a:lstStyle/>
+          <a:p>
+            <a:r>
+              <a:rPr lang="en-US" dirty="0"/>
+              <a:t>Step 1: Remove any application-specific implementation of entities</a:t>
+            </a:r>
+          </a:p>
+          <a:p>
+            <a:endParaRPr lang="en-US" dirty="0"/>
+          </a:p>
+          <a:p>
+            <a:r>
+              <a:rPr lang="en-US" dirty="0"/>
+              <a:t>Step 2: Hook into Spring Boot’s Flyway autoconfiguration</a:t>
+            </a:r>
+          </a:p>
+          <a:p>
+            <a:endParaRPr lang="en-US" dirty="0"/>
+          </a:p>
+          <a:p>
+            <a:r>
+              <a:rPr lang="en-US" dirty="0"/>
+              <a:t>Step 3: Create code to execute certain scripts before &amp; after the service scripts are executed</a:t>
+            </a:r>
+          </a:p>
+        </p:txBody>
+      </p:sp>
+    </p:spTree>
+    <p:extLst>
+      <p:ext uri="{BB962C8B-B14F-4D97-AF65-F5344CB8AC3E}">
+        <p14:creationId xmlns:p14="http://schemas.microsoft.com/office/powerpoint/2010/main" val="2432134010"/>
+      </p:ext>
+    </p:extLst>
+  </p:cSld>
+  <p:clrMapOvr>
+    <a:masterClrMapping/>
+  </p:clrMapOvr>
+</p:sld>
+</file>
+
+<file path=ppt/slides/slide12.xml><?xml version="1.0" encoding="utf-8"?>
+<p:sld xmlns:a="http://schemas.openxmlformats.org/drawingml/2006/main" xmlns:r="http://schemas.openxmlformats.org/officeDocument/2006/relationships" xmlns:p="http://schemas.openxmlformats.org/presentationml/2006/main">
+  <p:cSld>
+    <p:spTree>
+      <p:nvGrpSpPr>
+        <p:cNvPr id="1" name=""/>
+        <p:cNvGrpSpPr/>
+        <p:nvPr/>
+      </p:nvGrpSpPr>
+      <p:grpSpPr>
+        <a:xfrm>
+          <a:off x="0" y="0"/>
+          <a:ext cx="0" cy="0"/>
+          <a:chOff x="0" y="0"/>
+          <a:chExt cx="0" cy="0"/>
+        </a:xfrm>
+      </p:grpSpPr>
+      <p:sp>
+        <p:nvSpPr>
+          <p:cNvPr id="2" name="Titel 1"/>
+          <p:cNvSpPr>
+            <a:spLocks noGrp="1"/>
+          </p:cNvSpPr>
+          <p:nvPr>
+            <p:ph type="title"/>
+          </p:nvPr>
+        </p:nvSpPr>
+        <p:spPr/>
+        <p:txBody>
           <a:bodyPr>
             <a:normAutofit fontScale="90000"/>
           </a:bodyPr>
@@ -2375,7 +2459,7 @@
 </p:sld>
 </file>
 
-<file path=ppt/slides/slide12.xml><?xml version="1.0" encoding="utf-8"?>
+<file path=ppt/slides/slide13.xml><?xml version="1.0" encoding="utf-8"?>
 <p:sld xmlns:a="http://schemas.openxmlformats.org/drawingml/2006/main" xmlns:r="http://schemas.openxmlformats.org/officeDocument/2006/relationships" xmlns:p="http://schemas.openxmlformats.org/presentationml/2006/main">
   <p:cSld>
     <p:spTree>
@@ -2973,6 +3057,111 @@
 </file>
 
 <file path=ppt/slides/slide6.xml><?xml version="1.0" encoding="utf-8"?>
+<p:sld xmlns:a="http://schemas.openxmlformats.org/drawingml/2006/main" xmlns:r="http://schemas.openxmlformats.org/officeDocument/2006/relationships" xmlns:p="http://schemas.openxmlformats.org/presentationml/2006/main">
+  <p:cSld>
+    <p:spTree>
+      <p:nvGrpSpPr>
+        <p:cNvPr id="1" name=""/>
+        <p:cNvGrpSpPr/>
+        <p:nvPr/>
+      </p:nvGrpSpPr>
+      <p:grpSpPr>
+        <a:xfrm>
+          <a:off x="0" y="0"/>
+          <a:ext cx="0" cy="0"/>
+          <a:chOff x="0" y="0"/>
+          <a:chExt cx="0" cy="0"/>
+        </a:xfrm>
+      </p:grpSpPr>
+      <p:sp>
+        <p:nvSpPr>
+          <p:cNvPr id="2" name="Titel 1"/>
+          <p:cNvSpPr>
+            <a:spLocks noGrp="1"/>
+          </p:cNvSpPr>
+          <p:nvPr>
+            <p:ph type="title"/>
+          </p:nvPr>
+        </p:nvSpPr>
+        <p:spPr/>
+        <p:txBody>
+          <a:bodyPr/>
+          <a:lstStyle/>
+          <a:p>
+            <a:r>
+              <a:rPr lang="en-US" dirty="0" smtClean="0"/>
+              <a:t>Content workshop</a:t>
+            </a:r>
+            <a:endParaRPr lang="en-US" dirty="0"/>
+          </a:p>
+        </p:txBody>
+      </p:sp>
+      <p:sp>
+        <p:nvSpPr>
+          <p:cNvPr id="3" name="Tijdelijke aanduiding voor inhoud 2"/>
+          <p:cNvSpPr>
+            <a:spLocks noGrp="1"/>
+          </p:cNvSpPr>
+          <p:nvPr>
+            <p:ph idx="1"/>
+          </p:nvPr>
+        </p:nvSpPr>
+        <p:spPr/>
+        <p:txBody>
+          <a:bodyPr>
+            <a:normAutofit/>
+          </a:bodyPr>
+          <a:lstStyle/>
+          <a:p>
+            <a:pPr marL="0" indent="0">
+              <a:buNone/>
+            </a:pPr>
+            <a:r>
+              <a:rPr lang="en-US" dirty="0" smtClean="0"/>
+              <a:t>3 labs covering the following topics:</a:t>
+            </a:r>
+            <a:endParaRPr lang="en-US" dirty="0"/>
+          </a:p>
+          <a:p>
+            <a:r>
+              <a:rPr lang="en-US" dirty="0" smtClean="0"/>
+              <a:t>Centralized dependency management based on Spring Boot</a:t>
+            </a:r>
+            <a:endParaRPr lang="en-US" dirty="0"/>
+          </a:p>
+          <a:p>
+            <a:r>
+              <a:rPr lang="en-US" dirty="0" smtClean="0"/>
+              <a:t>Shared JPA entities and Flyway scripts on top of application specific implementation</a:t>
+            </a:r>
+          </a:p>
+          <a:p>
+            <a:r>
+              <a:rPr lang="en-US" dirty="0" smtClean="0"/>
+              <a:t>Centralized JMS </a:t>
+            </a:r>
+            <a:r>
+              <a:rPr lang="en-US" dirty="0" err="1" smtClean="0"/>
+              <a:t>messagehandling</a:t>
+            </a:r>
+            <a:endParaRPr lang="en-US" dirty="0"/>
+          </a:p>
+        </p:txBody>
+      </p:sp>
+    </p:spTree>
+    <p:extLst>
+      <p:ext uri="{BB962C8B-B14F-4D97-AF65-F5344CB8AC3E}">
+        <p14:creationId xmlns:p14="http://schemas.microsoft.com/office/powerpoint/2010/main" val="171985819"/>
+      </p:ext>
+    </p:extLst>
+  </p:cSld>
+  <p:clrMapOvr>
+    <a:masterClrMapping/>
+  </p:clrMapOvr>
+</p:sld>
+</file>
+
+<file path=ppt/slides/slide7.xml><?xml version="1.0" encoding="utf-8"?>
 <p:sld xmlns:a="http://schemas.openxmlformats.org/drawingml/2006/main" xmlns:r="http://schemas.openxmlformats.org/officeDocument/2006/relationships" xmlns:p="http://schemas.openxmlformats.org/presentationml/2006/main">
   <p:cSld>
     <p:spTree>
@@ -3421,8 +3610,8 @@
         </p:nvSpPr>
         <p:spPr>
           <a:xfrm>
-            <a:off x="1333850" y="2845273"/>
-            <a:ext cx="1566645" cy="300082"/>
+            <a:off x="1161288" y="2845273"/>
+            <a:ext cx="1739207" cy="300082"/>
           </a:xfrm>
           <a:prstGeom prst="rect">
             <a:avLst/>
@@ -3464,7 +3653,7 @@
 </p:sld>
 </file>
 
-<file path=ppt/slides/slide7.xml><?xml version="1.0" encoding="utf-8"?>
+<file path=ppt/slides/slide8.xml><?xml version="1.0" encoding="utf-8"?>
 <p:sld xmlns:a="http://schemas.openxmlformats.org/drawingml/2006/main" xmlns:r="http://schemas.openxmlformats.org/officeDocument/2006/relationships" xmlns:p="http://schemas.openxmlformats.org/presentationml/2006/main">
   <p:cSld>
     <p:spTree>
@@ -3916,8 +4105,17 @@
               <a:rPr lang="en-US" sz="1350" dirty="0">
                 <a:latin typeface="Exo 2.0" panose="00000500000000000000" pitchFamily="50" charset="0"/>
               </a:rPr>
-              <a:t>Old-style application : </a:t>
-            </a:r>
+              <a:t>Old-style </a:t>
+            </a:r>
+            <a:r>
+              <a:rPr lang="en-US" sz="1350" dirty="0" smtClean="0">
+                <a:latin typeface="Exo 2.0" panose="00000500000000000000" pitchFamily="50" charset="0"/>
+              </a:rPr>
+              <a:t>application: </a:t>
+            </a:r>
+            <a:endParaRPr lang="en-US" sz="1350" dirty="0">
+              <a:latin typeface="Exo 2.0" panose="00000500000000000000" pitchFamily="50" charset="0"/>
+            </a:endParaRPr>
           </a:p>
           <a:p>
             <a:pPr marL="557213" lvl="1" indent="-214313">
@@ -4114,106 +4312,6 @@
     <p:extLst>
       <p:ext uri="{BB962C8B-B14F-4D97-AF65-F5344CB8AC3E}">
         <p14:creationId xmlns:p14="http://schemas.microsoft.com/office/powerpoint/2010/main" val="1662498984"/>
-      </p:ext>
-    </p:extLst>
-  </p:cSld>
-  <p:clrMapOvr>
-    <a:masterClrMapping/>
-  </p:clrMapOvr>
-</p:sld>
-</file>
-
-<file path=ppt/slides/slide8.xml><?xml version="1.0" encoding="utf-8"?>
-<p:sld xmlns:a="http://schemas.openxmlformats.org/drawingml/2006/main" xmlns:r="http://schemas.openxmlformats.org/officeDocument/2006/relationships" xmlns:p="http://schemas.openxmlformats.org/presentationml/2006/main">
-  <p:cSld>
-    <p:spTree>
-      <p:nvGrpSpPr>
-        <p:cNvPr id="1" name=""/>
-        <p:cNvGrpSpPr/>
-        <p:nvPr/>
-      </p:nvGrpSpPr>
-      <p:grpSpPr>
-        <a:xfrm>
-          <a:off x="0" y="0"/>
-          <a:ext cx="0" cy="0"/>
-          <a:chOff x="0" y="0"/>
-          <a:chExt cx="0" cy="0"/>
-        </a:xfrm>
-      </p:grpSpPr>
-      <p:sp>
-        <p:nvSpPr>
-          <p:cNvPr id="2" name="Titel 1"/>
-          <p:cNvSpPr>
-            <a:spLocks noGrp="1"/>
-          </p:cNvSpPr>
-          <p:nvPr>
-            <p:ph type="title"/>
-          </p:nvPr>
-        </p:nvSpPr>
-        <p:spPr/>
-        <p:txBody>
-          <a:bodyPr/>
-          <a:lstStyle/>
-          <a:p>
-            <a:r>
-              <a:rPr lang="en-US" dirty="0"/>
-              <a:t>Requirements</a:t>
-            </a:r>
-          </a:p>
-        </p:txBody>
-      </p:sp>
-      <p:sp>
-        <p:nvSpPr>
-          <p:cNvPr id="8" name="Tijdelijke aanduiding voor inhoud 7"/>
-          <p:cNvSpPr>
-            <a:spLocks noGrp="1"/>
-          </p:cNvSpPr>
-          <p:nvPr>
-            <p:ph idx="1"/>
-          </p:nvPr>
-        </p:nvSpPr>
-        <p:spPr/>
-        <p:txBody>
-          <a:bodyPr/>
-          <a:lstStyle/>
-          <a:p>
-            <a:r>
-              <a:rPr lang="en-US" dirty="0" err="1"/>
-              <a:t>AcmeMessage</a:t>
-            </a:r>
-            <a:r>
-              <a:rPr lang="en-US" dirty="0"/>
-              <a:t> needs to be stored, so it can be traced&amp; resent if needed</a:t>
-            </a:r>
-          </a:p>
-          <a:p>
-            <a:r>
-              <a:rPr lang="en-US" dirty="0" err="1"/>
-              <a:t>Eclipselink</a:t>
-            </a:r>
-            <a:r>
-              <a:rPr lang="en-US" dirty="0"/>
-              <a:t> is the JPA implementation of choice</a:t>
-            </a:r>
-          </a:p>
-          <a:p>
-            <a:r>
-              <a:rPr lang="en-US" dirty="0"/>
-              <a:t>Uniform set of libraries across organization</a:t>
-            </a:r>
-          </a:p>
-          <a:p>
-            <a:r>
-              <a:rPr lang="en-US" dirty="0"/>
-              <a:t>Centralized control of shared entities</a:t>
-            </a:r>
-          </a:p>
-        </p:txBody>
-      </p:sp>
-    </p:spTree>
-    <p:extLst>
-      <p:ext uri="{BB962C8B-B14F-4D97-AF65-F5344CB8AC3E}">
-        <p14:creationId xmlns:p14="http://schemas.microsoft.com/office/powerpoint/2010/main" val="3580390359"/>
       </p:ext>
     </p:extLst>
   </p:cSld>
@@ -4257,14 +4355,14 @@
           <a:p>
             <a:r>
               <a:rPr lang="en-US" dirty="0"/>
-              <a:t>Lab 1: centralize stack</a:t>
+              <a:t>Requirements</a:t>
             </a:r>
           </a:p>
         </p:txBody>
       </p:sp>
       <p:sp>
         <p:nvSpPr>
-          <p:cNvPr id="3" name="Tijdelijke aanduiding voor inhoud 2"/>
+          <p:cNvPr id="8" name="Tijdelijke aanduiding voor inhoud 7"/>
           <p:cNvSpPr>
             <a:spLocks noGrp="1"/>
           </p:cNvSpPr>
@@ -4278,17 +4376,34 @@
           <a:lstStyle/>
           <a:p>
             <a:r>
+              <a:rPr lang="en-US" dirty="0" err="1"/>
+              <a:t>AcmeMessage</a:t>
+            </a:r>
+            <a:r>
               <a:rPr lang="en-US" dirty="0"/>
-              <a:t>Step 1: Make the framework build on the Spring Boot stack (adding to dependency management where necessary)</a:t>
-            </a:r>
-          </a:p>
-          <a:p>
-            <a:endParaRPr lang="en-US" dirty="0"/>
-          </a:p>
-          <a:p>
+              <a:t> needs to be stored, so it can be traced&amp; resent if needed</a:t>
+            </a:r>
+          </a:p>
+          <a:p>
+            <a:r>
+              <a:rPr lang="en-US" dirty="0" err="1"/>
+              <a:t>Eclipselink</a:t>
+            </a:r>
             <a:r>
               <a:rPr lang="en-US" dirty="0"/>
-              <a:t>Step 2: Create common starters to decouple from Spring Boot’s defaults</a:t>
+              <a:t> is the JPA implementation of choice</a:t>
+            </a:r>
+          </a:p>
+          <a:p>
+            <a:r>
+              <a:rPr lang="en-US" dirty="0"/>
+              <a:t>Uniform set of libraries across organization</a:t>
+            </a:r>
+          </a:p>
+          <a:p>
+            <a:r>
+              <a:rPr lang="en-US" dirty="0"/>
+              <a:t>Centralized control of shared entities</a:t>
             </a:r>
           </a:p>
         </p:txBody>
@@ -4296,7 +4411,7 @@
     </p:spTree>
     <p:extLst>
       <p:ext uri="{BB962C8B-B14F-4D97-AF65-F5344CB8AC3E}">
-        <p14:creationId xmlns:p14="http://schemas.microsoft.com/office/powerpoint/2010/main" val="2910224620"/>
+        <p14:creationId xmlns:p14="http://schemas.microsoft.com/office/powerpoint/2010/main" val="3580390359"/>
       </p:ext>
     </p:extLst>
   </p:cSld>

</xml_diff>

<commit_message>
Spelling correction & summary sheets added
</commit_message>
<xml_diff>
--- a/Spring boot - adapting to your environment.pptx
+++ b/Spring boot - adapting to your environment.pptx
@@ -5,10 +5,10 @@
     <p:sldMasterId id="2147483648" r:id="rId1"/>
   </p:sldMasterIdLst>
   <p:notesMasterIdLst>
-    <p:notesMasterId r:id="rId21"/>
+    <p:notesMasterId r:id="rId23"/>
   </p:notesMasterIdLst>
   <p:handoutMasterIdLst>
-    <p:handoutMasterId r:id="rId22"/>
+    <p:handoutMasterId r:id="rId24"/>
   </p:handoutMasterIdLst>
   <p:sldIdLst>
     <p:sldId id="258" r:id="rId2"/>
@@ -29,7 +29,9 @@
     <p:sldId id="267" r:id="rId17"/>
     <p:sldId id="268" r:id="rId18"/>
     <p:sldId id="274" r:id="rId19"/>
-    <p:sldId id="260" r:id="rId20"/>
+    <p:sldId id="283" r:id="rId20"/>
+    <p:sldId id="284" r:id="rId21"/>
+    <p:sldId id="260" r:id="rId22"/>
   </p:sldIdLst>
   <p:sldSz cx="9144000" cy="6858000" type="screen4x3"/>
   <p:notesSz cx="6858000" cy="9144000"/>
@@ -233,7 +235,7 @@
           <a:p>
             <a:fld id="{B6CAA392-5ACD-A84F-9824-1CE0A24F5EF1}" type="datetimeFigureOut">
               <a:rPr lang="en-US" smtClean="0"/>
-              <a:t>05/17/2017</a:t>
+              <a:t>05/18/2017</a:t>
             </a:fld>
             <a:endParaRPr lang="en-US"/>
           </a:p>
@@ -399,7 +401,7 @@
           <a:p>
             <a:fld id="{97D69B69-5611-364E-A30B-2E39388589D2}" type="datetimeFigureOut">
               <a:rPr lang="en-US" smtClean="0"/>
-              <a:t>05/17/2017</a:t>
+              <a:t>05/18/2017</a:t>
             </a:fld>
             <a:endParaRPr lang="en-US"/>
           </a:p>
@@ -3989,15 +3991,7 @@
             </a:r>
             <a:r>
               <a:rPr lang="en-US" dirty="0"/>
-              <a:t> </a:t>
-            </a:r>
-            <a:r>
-              <a:rPr lang="en-US" dirty="0" err="1"/>
-              <a:t>annotion</a:t>
-            </a:r>
-            <a:r>
-              <a:rPr lang="en-US" dirty="0"/>
-              <a:t> to the </a:t>
+              <a:t> annotation to the </a:t>
             </a:r>
             <a:r>
               <a:rPr lang="en-US" dirty="0" err="1"/>
@@ -4039,7 +4033,7 @@
       </p:grpSpPr>
       <p:sp>
         <p:nvSpPr>
-          <p:cNvPr id="2" name="Title 1"/>
+          <p:cNvPr id="2" name="Titel 1"/>
           <p:cNvSpPr>
             <a:spLocks noGrp="1"/>
           </p:cNvSpPr>
@@ -4053,12 +4047,48 @@
           <a:lstStyle/>
           <a:p>
             <a:r>
-              <a:rPr lang="en-US" dirty="0">
-                <a:solidFill>
-                  <a:srgbClr val="D0AE55"/>
-                </a:solidFill>
-              </a:rPr>
-              <a:t>Q&amp;A</a:t>
+              <a:rPr lang="en-US" dirty="0"/>
+              <a:t>Summary</a:t>
+            </a:r>
+          </a:p>
+        </p:txBody>
+      </p:sp>
+      <p:sp>
+        <p:nvSpPr>
+          <p:cNvPr id="3" name="Tijdelijke aanduiding voor inhoud 2"/>
+          <p:cNvSpPr>
+            <a:spLocks noGrp="1"/>
+          </p:cNvSpPr>
+          <p:nvPr>
+            <p:ph idx="1"/>
+          </p:nvPr>
+        </p:nvSpPr>
+        <p:spPr/>
+        <p:txBody>
+          <a:bodyPr/>
+          <a:lstStyle/>
+          <a:p>
+            <a:r>
+              <a:rPr lang="en-US" dirty="0"/>
+              <a:t>Overriding starters</a:t>
+            </a:r>
+          </a:p>
+          <a:p>
+            <a:endParaRPr lang="en-US" dirty="0"/>
+          </a:p>
+          <a:p>
+            <a:r>
+              <a:rPr lang="en-US" dirty="0"/>
+              <a:t>Creating custom autoconfigure</a:t>
+            </a:r>
+          </a:p>
+          <a:p>
+            <a:endParaRPr lang="en-US" dirty="0"/>
+          </a:p>
+          <a:p>
+            <a:r>
+              <a:rPr lang="en-US" dirty="0"/>
+              <a:t>Using custom annotations for convenience</a:t>
             </a:r>
           </a:p>
         </p:txBody>
@@ -4066,7 +4096,7 @@
     </p:spTree>
     <p:extLst>
       <p:ext uri="{BB962C8B-B14F-4D97-AF65-F5344CB8AC3E}">
-        <p14:creationId xmlns:p14="http://schemas.microsoft.com/office/powerpoint/2010/main" val="1729372591"/>
+        <p14:creationId xmlns:p14="http://schemas.microsoft.com/office/powerpoint/2010/main" val="94056558"/>
       </p:ext>
     </p:extLst>
   </p:cSld>
@@ -4293,6 +4323,174 @@
     <p:extLst>
       <p:ext uri="{BB962C8B-B14F-4D97-AF65-F5344CB8AC3E}">
         <p14:creationId xmlns:p14="http://schemas.microsoft.com/office/powerpoint/2010/main" val="1106128601"/>
+      </p:ext>
+    </p:extLst>
+  </p:cSld>
+  <p:clrMapOvr>
+    <a:masterClrMapping/>
+  </p:clrMapOvr>
+</p:sld>
+</file>
+
+<file path=ppt/slides/slide20.xml><?xml version="1.0" encoding="utf-8"?>
+<p:sld xmlns:a="http://schemas.openxmlformats.org/drawingml/2006/main" xmlns:r="http://schemas.openxmlformats.org/officeDocument/2006/relationships" xmlns:p="http://schemas.openxmlformats.org/presentationml/2006/main">
+  <p:cSld>
+    <p:spTree>
+      <p:nvGrpSpPr>
+        <p:cNvPr id="1" name=""/>
+        <p:cNvGrpSpPr/>
+        <p:nvPr/>
+      </p:nvGrpSpPr>
+      <p:grpSpPr>
+        <a:xfrm>
+          <a:off x="0" y="0"/>
+          <a:ext cx="0" cy="0"/>
+          <a:chOff x="0" y="0"/>
+          <a:chExt cx="0" cy="0"/>
+        </a:xfrm>
+      </p:grpSpPr>
+      <p:sp>
+        <p:nvSpPr>
+          <p:cNvPr id="2" name="Titel 1"/>
+          <p:cNvSpPr>
+            <a:spLocks noGrp="1"/>
+          </p:cNvSpPr>
+          <p:nvPr>
+            <p:ph type="title"/>
+          </p:nvPr>
+        </p:nvSpPr>
+        <p:spPr/>
+        <p:txBody>
+          <a:bodyPr/>
+          <a:lstStyle/>
+          <a:p>
+            <a:r>
+              <a:rPr lang="en-US" dirty="0"/>
+              <a:t>Imagine…</a:t>
+            </a:r>
+          </a:p>
+        </p:txBody>
+      </p:sp>
+      <p:sp>
+        <p:nvSpPr>
+          <p:cNvPr id="3" name="Tijdelijke aanduiding voor inhoud 2"/>
+          <p:cNvSpPr>
+            <a:spLocks noGrp="1"/>
+          </p:cNvSpPr>
+          <p:nvPr>
+            <p:ph idx="1"/>
+          </p:nvPr>
+        </p:nvSpPr>
+        <p:spPr/>
+        <p:txBody>
+          <a:bodyPr>
+            <a:normAutofit lnSpcReduction="10000"/>
+          </a:bodyPr>
+          <a:lstStyle/>
+          <a:p>
+            <a:r>
+              <a:rPr lang="en-US" dirty="0"/>
+              <a:t>No spring-boot-starter-parent</a:t>
+            </a:r>
+          </a:p>
+          <a:p>
+            <a:r>
+              <a:rPr lang="en-US" dirty="0"/>
+              <a:t>Plugin management in parent</a:t>
+            </a:r>
+          </a:p>
+          <a:p>
+            <a:r>
+              <a:rPr lang="en-US" dirty="0"/>
+              <a:t>Uniform diversifying properties</a:t>
+            </a:r>
+          </a:p>
+          <a:p>
+            <a:r>
+              <a:rPr lang="en-US" dirty="0"/>
+              <a:t>Overruling dependency versions</a:t>
+            </a:r>
+          </a:p>
+          <a:p>
+            <a:r>
+              <a:rPr lang="en-US" dirty="0"/>
+              <a:t>Centralized extensive configuration, e.g. Quartz</a:t>
+            </a:r>
+          </a:p>
+          <a:p>
+            <a:r>
+              <a:rPr lang="en-US" dirty="0"/>
+              <a:t>Customizing default logging layout</a:t>
+            </a:r>
+          </a:p>
+          <a:p>
+            <a:r>
+              <a:rPr lang="en-US" dirty="0"/>
+              <a:t>…</a:t>
+            </a:r>
+          </a:p>
+        </p:txBody>
+      </p:sp>
+    </p:spTree>
+    <p:extLst>
+      <p:ext uri="{BB962C8B-B14F-4D97-AF65-F5344CB8AC3E}">
+        <p14:creationId xmlns:p14="http://schemas.microsoft.com/office/powerpoint/2010/main" val="1180048232"/>
+      </p:ext>
+    </p:extLst>
+  </p:cSld>
+  <p:clrMapOvr>
+    <a:masterClrMapping/>
+  </p:clrMapOvr>
+</p:sld>
+</file>
+
+<file path=ppt/slides/slide21.xml><?xml version="1.0" encoding="utf-8"?>
+<p:sld xmlns:a="http://schemas.openxmlformats.org/drawingml/2006/main" xmlns:r="http://schemas.openxmlformats.org/officeDocument/2006/relationships" xmlns:p="http://schemas.openxmlformats.org/presentationml/2006/main">
+  <p:cSld>
+    <p:spTree>
+      <p:nvGrpSpPr>
+        <p:cNvPr id="1" name=""/>
+        <p:cNvGrpSpPr/>
+        <p:nvPr/>
+      </p:nvGrpSpPr>
+      <p:grpSpPr>
+        <a:xfrm>
+          <a:off x="0" y="0"/>
+          <a:ext cx="0" cy="0"/>
+          <a:chOff x="0" y="0"/>
+          <a:chExt cx="0" cy="0"/>
+        </a:xfrm>
+      </p:grpSpPr>
+      <p:sp>
+        <p:nvSpPr>
+          <p:cNvPr id="2" name="Title 1"/>
+          <p:cNvSpPr>
+            <a:spLocks noGrp="1"/>
+          </p:cNvSpPr>
+          <p:nvPr>
+            <p:ph type="title"/>
+          </p:nvPr>
+        </p:nvSpPr>
+        <p:spPr/>
+        <p:txBody>
+          <a:bodyPr/>
+          <a:lstStyle/>
+          <a:p>
+            <a:r>
+              <a:rPr lang="en-US" dirty="0">
+                <a:solidFill>
+                  <a:srgbClr val="D0AE55"/>
+                </a:solidFill>
+              </a:rPr>
+              <a:t>Q&amp;A</a:t>
+            </a:r>
+          </a:p>
+        </p:txBody>
+      </p:sp>
+    </p:spTree>
+    <p:extLst>
+      <p:ext uri="{BB962C8B-B14F-4D97-AF65-F5344CB8AC3E}">
+        <p14:creationId xmlns:p14="http://schemas.microsoft.com/office/powerpoint/2010/main" val="1729372591"/>
       </p:ext>
     </p:extLst>
   </p:cSld>

</xml_diff>